<commit_message>
DesignExample from pptx to pdf - never wanna do such a conversion again
</commit_message>
<xml_diff>
--- a/designExamples.pptx
+++ b/designExamples.pptx
@@ -382,11 +382,11 @@
           <c:showPercent val="0"/>
           <c:showBubbleSize val="0"/>
         </c:dLbls>
-        <c:axId val="1007025464"/>
-        <c:axId val="1007100504"/>
+        <c:axId val="2050881880"/>
+        <c:axId val="2053275464"/>
       </c:scatterChart>
       <c:valAx>
-        <c:axId val="1007025464"/>
+        <c:axId val="2050881880"/>
         <c:scaling>
           <c:logBase val="2.0"/>
           <c:orientation val="minMax"/>
@@ -431,13 +431,13 @@
             <a:endParaRPr lang="en-US"/>
           </a:p>
         </c:txPr>
-        <c:crossAx val="1007100504"/>
+        <c:crossAx val="2053275464"/>
         <c:crosses val="autoZero"/>
         <c:crossBetween val="midCat"/>
         <c:majorUnit val="2.0"/>
       </c:valAx>
       <c:valAx>
-        <c:axId val="1007100504"/>
+        <c:axId val="2053275464"/>
         <c:scaling>
           <c:logBase val="2.0"/>
           <c:orientation val="minMax"/>
@@ -485,7 +485,7 @@
             <a:endParaRPr lang="en-US"/>
           </a:p>
         </c:txPr>
-        <c:crossAx val="1007025464"/>
+        <c:crossAx val="2050881880"/>
         <c:crosses val="autoZero"/>
         <c:crossBetween val="midCat"/>
         <c:majorUnit val="2.0"/>
@@ -764,7 +764,7 @@
           <a:p>
             <a:fld id="{74504F5D-E38D-3641-802A-EEE0508E3D0C}" type="datetimeFigureOut">
               <a:rPr lang="en-US" smtClean="0"/>
-              <a:t>9/15/12</a:t>
+              <a:t>11/8/12</a:t>
             </a:fld>
             <a:endParaRPr lang="en-US"/>
           </a:p>
@@ -1317,72 +1317,70 @@
       </p:grpSpPr>
       <p:sp>
         <p:nvSpPr>
-          <p:cNvPr id="76802" name="Rectangle 7"/>
-          <p:cNvSpPr>
-            <a:spLocks noGrp="1" noChangeArrowheads="1"/>
-          </p:cNvSpPr>
-          <p:nvPr>
-            <p:ph type="sldNum" sz="quarter" idx="5"/>
-          </p:nvPr>
-        </p:nvSpPr>
-        <p:spPr>
-          <a:noFill/>
-        </p:spPr>
-        <p:txBody>
-          <a:bodyPr/>
-          <a:lstStyle/>
-          <a:p>
-            <a:fld id="{74EE1C46-5B6B-4637-A2A1-BAEA4C622F53}" type="slidenum">
-              <a:rPr lang="en-US" smtClean="0"/>
-              <a:pPr/>
-              <a:t>4</a:t>
-            </a:fld>
-            <a:endParaRPr lang="en-US" smtClean="0"/>
-          </a:p>
-        </p:txBody>
-      </p:sp>
-      <p:sp>
-        <p:nvSpPr>
-          <p:cNvPr id="76803" name="Rectangle 2"/>
-          <p:cNvSpPr>
-            <a:spLocks noGrp="1" noRot="1" noChangeAspect="1" noChangeArrowheads="1" noTextEdit="1"/>
+          <p:cNvPr id="2" name="Slide Image Placeholder 1"/>
+          <p:cNvSpPr>
+            <a:spLocks noGrp="1" noRot="1" noChangeAspect="1"/>
           </p:cNvSpPr>
           <p:nvPr>
             <p:ph type="sldImg"/>
           </p:nvPr>
         </p:nvSpPr>
-        <p:spPr>
-          <a:ln/>
-        </p:spPr>
-      </p:sp>
-      <p:sp>
-        <p:nvSpPr>
-          <p:cNvPr id="76804" name="Rectangle 3"/>
-          <p:cNvSpPr>
-            <a:spLocks noGrp="1" noChangeArrowheads="1"/>
+        <p:spPr/>
+      </p:sp>
+      <p:sp>
+        <p:nvSpPr>
+          <p:cNvPr id="3" name="Notes Placeholder 2"/>
+          <p:cNvSpPr>
+            <a:spLocks noGrp="1"/>
           </p:cNvSpPr>
           <p:nvPr>
             <p:ph type="body" idx="1"/>
           </p:nvPr>
         </p:nvSpPr>
-        <p:spPr>
-          <a:noFill/>
-          <a:ln/>
-        </p:spPr>
+        <p:spPr/>
         <p:txBody>
           <a:bodyPr/>
           <a:lstStyle/>
           <a:p>
-            <a:pPr eaLnBrk="1" hangingPunct="1">
-              <a:spcBef>
-                <a:spcPct val="0"/>
-              </a:spcBef>
+            <a:endParaRPr lang="en-US" dirty="0"/>
+          </a:p>
+        </p:txBody>
+      </p:sp>
+      <p:sp>
+        <p:nvSpPr>
+          <p:cNvPr id="4" name="Slide Number Placeholder 3"/>
+          <p:cNvSpPr>
+            <a:spLocks noGrp="1"/>
+          </p:cNvSpPr>
+          <p:nvPr>
+            <p:ph type="sldNum" sz="quarter" idx="10"/>
+          </p:nvPr>
+        </p:nvSpPr>
+        <p:spPr/>
+        <p:txBody>
+          <a:bodyPr/>
+          <a:lstStyle/>
+          <a:p>
+            <a:pPr>
+              <a:defRPr/>
             </a:pPr>
-            <a:endParaRPr lang="en-US" smtClean="0"/>
+            <a:fld id="{BB04B643-C74C-455E-AFCB-1138D85C2B9E}" type="slidenum">
+              <a:rPr lang="en-US" smtClean="0"/>
+              <a:pPr>
+                <a:defRPr/>
+              </a:pPr>
+              <a:t>3</a:t>
+            </a:fld>
+            <a:endParaRPr lang="en-US" dirty="0"/>
           </a:p>
         </p:txBody>
       </p:sp>
     </p:spTree>
+    <p:extLst>
+      <p:ext uri="{BB962C8B-B14F-4D97-AF65-F5344CB8AC3E}">
+        <p14:creationId xmlns:p14="http://schemas.microsoft.com/office/powerpoint/2010/main" val="932141305"/>
+      </p:ext>
+    </p:extLst>
   </p:cSld>
   <p:clrMapOvr>
     <a:masterClrMapping/>
@@ -1409,7 +1407,7 @@
       </p:grpSpPr>
       <p:sp>
         <p:nvSpPr>
-          <p:cNvPr id="77826" name="Rectangle 7"/>
+          <p:cNvPr id="76802" name="Rectangle 7"/>
           <p:cNvSpPr>
             <a:spLocks noGrp="1" noChangeArrowheads="1"/>
           </p:cNvSpPr>
@@ -1424,10 +1422,10 @@
           <a:bodyPr/>
           <a:lstStyle/>
           <a:p>
-            <a:fld id="{AF61AFBA-2533-4D53-9FC5-FB020C8F9006}" type="slidenum">
+            <a:fld id="{74EE1C46-5B6B-4637-A2A1-BAEA4C622F53}" type="slidenum">
               <a:rPr lang="en-US" smtClean="0"/>
               <a:pPr/>
-              <a:t>5</a:t>
+              <a:t>4</a:t>
             </a:fld>
             <a:endParaRPr lang="en-US" smtClean="0"/>
           </a:p>
@@ -1435,7 +1433,7 @@
       </p:sp>
       <p:sp>
         <p:nvSpPr>
-          <p:cNvPr id="77827" name="Rectangle 2"/>
+          <p:cNvPr id="76803" name="Rectangle 2"/>
           <p:cNvSpPr>
             <a:spLocks noGrp="1" noRot="1" noChangeAspect="1" noChangeArrowheads="1" noTextEdit="1"/>
           </p:cNvSpPr>
@@ -1444,16 +1442,12 @@
           </p:nvPr>
         </p:nvSpPr>
         <p:spPr>
-          <a:xfrm>
-            <a:off x="1144588" y="685800"/>
-            <a:ext cx="4572000" cy="3429000"/>
-          </a:xfrm>
           <a:ln/>
         </p:spPr>
       </p:sp>
       <p:sp>
         <p:nvSpPr>
-          <p:cNvPr id="77828" name="Rectangle 3"/>
+          <p:cNvPr id="76804" name="Rectangle 3"/>
           <p:cNvSpPr>
             <a:spLocks noGrp="1" noChangeArrowheads="1"/>
           </p:cNvSpPr>
@@ -1462,10 +1456,6 @@
           </p:nvPr>
         </p:nvSpPr>
         <p:spPr>
-          <a:xfrm>
-            <a:off x="915988" y="4343400"/>
-            <a:ext cx="5026025" cy="4114800"/>
-          </a:xfrm>
           <a:noFill/>
           <a:ln/>
         </p:spPr>
@@ -1473,7 +1463,11 @@
           <a:bodyPr/>
           <a:lstStyle/>
           <a:p>
-            <a:pPr eaLnBrk="1" hangingPunct="1"/>
+            <a:pPr eaLnBrk="1" hangingPunct="1">
+              <a:spcBef>
+                <a:spcPct val="0"/>
+              </a:spcBef>
+            </a:pPr>
             <a:endParaRPr lang="en-US" smtClean="0"/>
           </a:p>
         </p:txBody>
@@ -1505,58 +1499,72 @@
       </p:grpSpPr>
       <p:sp>
         <p:nvSpPr>
-          <p:cNvPr id="2" name="Slide Image Placeholder 1"/>
-          <p:cNvSpPr>
-            <a:spLocks noGrp="1" noRot="1" noChangeAspect="1"/>
+          <p:cNvPr id="77826" name="Rectangle 7"/>
+          <p:cNvSpPr>
+            <a:spLocks noGrp="1" noChangeArrowheads="1"/>
+          </p:cNvSpPr>
+          <p:nvPr>
+            <p:ph type="sldNum" sz="quarter" idx="5"/>
+          </p:nvPr>
+        </p:nvSpPr>
+        <p:spPr>
+          <a:noFill/>
+        </p:spPr>
+        <p:txBody>
+          <a:bodyPr/>
+          <a:lstStyle/>
+          <a:p>
+            <a:fld id="{AF61AFBA-2533-4D53-9FC5-FB020C8F9006}" type="slidenum">
+              <a:rPr lang="en-US" smtClean="0"/>
+              <a:pPr/>
+              <a:t>5</a:t>
+            </a:fld>
+            <a:endParaRPr lang="en-US" smtClean="0"/>
+          </a:p>
+        </p:txBody>
+      </p:sp>
+      <p:sp>
+        <p:nvSpPr>
+          <p:cNvPr id="77827" name="Rectangle 2"/>
+          <p:cNvSpPr>
+            <a:spLocks noGrp="1" noRot="1" noChangeAspect="1" noChangeArrowheads="1" noTextEdit="1"/>
           </p:cNvSpPr>
           <p:nvPr>
             <p:ph type="sldImg"/>
           </p:nvPr>
         </p:nvSpPr>
-        <p:spPr/>
-      </p:sp>
-      <p:sp>
-        <p:nvSpPr>
-          <p:cNvPr id="3" name="Notes Placeholder 2"/>
-          <p:cNvSpPr>
-            <a:spLocks noGrp="1"/>
+        <p:spPr>
+          <a:xfrm>
+            <a:off x="1144588" y="685800"/>
+            <a:ext cx="4572000" cy="3429000"/>
+          </a:xfrm>
+          <a:ln/>
+        </p:spPr>
+      </p:sp>
+      <p:sp>
+        <p:nvSpPr>
+          <p:cNvPr id="77828" name="Rectangle 3"/>
+          <p:cNvSpPr>
+            <a:spLocks noGrp="1" noChangeArrowheads="1"/>
           </p:cNvSpPr>
           <p:nvPr>
             <p:ph type="body" idx="1"/>
           </p:nvPr>
         </p:nvSpPr>
-        <p:spPr/>
-        <p:txBody>
-          <a:bodyPr>
-            <a:normAutofit/>
-          </a:bodyPr>
-          <a:lstStyle/>
-          <a:p>
-            <a:endParaRPr lang="en-US" dirty="0"/>
-          </a:p>
-        </p:txBody>
-      </p:sp>
-      <p:sp>
-        <p:nvSpPr>
-          <p:cNvPr id="4" name="Slide Number Placeholder 3"/>
-          <p:cNvSpPr>
-            <a:spLocks noGrp="1"/>
-          </p:cNvSpPr>
-          <p:nvPr>
-            <p:ph type="sldNum" sz="quarter" idx="10"/>
-          </p:nvPr>
-        </p:nvSpPr>
-        <p:spPr/>
+        <p:spPr>
+          <a:xfrm>
+            <a:off x="915988" y="4343400"/>
+            <a:ext cx="5026025" cy="4114800"/>
+          </a:xfrm>
+          <a:noFill/>
+          <a:ln/>
+        </p:spPr>
         <p:txBody>
           <a:bodyPr/>
           <a:lstStyle/>
           <a:p>
-            <a:fld id="{C3BF1F15-8CA5-B945-9912-5D2AAE0556DE}" type="slidenum">
-              <a:rPr lang="en-US" smtClean="0"/>
-              <a:pPr/>
-              <a:t>7</a:t>
-            </a:fld>
-            <a:endParaRPr lang="en-US"/>
+            <a:pPr eaLnBrk="1" hangingPunct="1"/>
+            <a:endParaRPr lang="en-US" smtClean="0"/>
           </a:p>
         </p:txBody>
       </p:sp>
@@ -1587,21 +1595,19 @@
       </p:grpSpPr>
       <p:sp>
         <p:nvSpPr>
-          <p:cNvPr id="80898" name="Slide Image Placeholder 1"/>
-          <p:cNvSpPr>
-            <a:spLocks noGrp="1" noRot="1" noChangeAspect="1" noTextEdit="1"/>
+          <p:cNvPr id="2" name="Slide Image Placeholder 1"/>
+          <p:cNvSpPr>
+            <a:spLocks noGrp="1" noRot="1" noChangeAspect="1"/>
           </p:cNvSpPr>
           <p:nvPr>
             <p:ph type="sldImg"/>
           </p:nvPr>
         </p:nvSpPr>
-        <p:spPr>
-          <a:ln/>
-        </p:spPr>
-      </p:sp>
-      <p:sp>
-        <p:nvSpPr>
-          <p:cNvPr id="80899" name="Notes Placeholder 2"/>
+        <p:spPr/>
+      </p:sp>
+      <p:sp>
+        <p:nvSpPr>
+          <p:cNvPr id="3" name="Notes Placeholder 2"/>
           <p:cNvSpPr>
             <a:spLocks noGrp="1"/>
           </p:cNvSpPr>
@@ -1609,41 +1615,38 @@
             <p:ph type="body" idx="1"/>
           </p:nvPr>
         </p:nvSpPr>
-        <p:spPr>
-          <a:noFill/>
-          <a:ln/>
-        </p:spPr>
+        <p:spPr/>
+        <p:txBody>
+          <a:bodyPr>
+            <a:normAutofit/>
+          </a:bodyPr>
+          <a:lstStyle/>
+          <a:p>
+            <a:endParaRPr lang="en-US" dirty="0"/>
+          </a:p>
+        </p:txBody>
+      </p:sp>
+      <p:sp>
+        <p:nvSpPr>
+          <p:cNvPr id="4" name="Slide Number Placeholder 3"/>
+          <p:cNvSpPr>
+            <a:spLocks noGrp="1"/>
+          </p:cNvSpPr>
+          <p:nvPr>
+            <p:ph type="sldNum" sz="quarter" idx="10"/>
+          </p:nvPr>
+        </p:nvSpPr>
+        <p:spPr/>
         <p:txBody>
           <a:bodyPr/>
           <a:lstStyle/>
           <a:p>
-            <a:endParaRPr lang="en-US" smtClean="0"/>
-          </a:p>
-        </p:txBody>
-      </p:sp>
-      <p:sp>
-        <p:nvSpPr>
-          <p:cNvPr id="80900" name="Slide Number Placeholder 3"/>
-          <p:cNvSpPr>
-            <a:spLocks noGrp="1"/>
-          </p:cNvSpPr>
-          <p:nvPr>
-            <p:ph type="sldNum" sz="quarter" idx="5"/>
-          </p:nvPr>
-        </p:nvSpPr>
-        <p:spPr>
-          <a:noFill/>
-        </p:spPr>
-        <p:txBody>
-          <a:bodyPr/>
-          <a:lstStyle/>
-          <a:p>
-            <a:fld id="{B6C9B5E5-857B-4897-A1D5-E0801B03E2E1}" type="slidenum">
+            <a:fld id="{C3BF1F15-8CA5-B945-9912-5D2AAE0556DE}" type="slidenum">
               <a:rPr lang="en-US" smtClean="0"/>
               <a:pPr/>
-              <a:t>8</a:t>
+              <a:t>7</a:t>
             </a:fld>
-            <a:endParaRPr lang="en-US" smtClean="0"/>
+            <a:endParaRPr lang="en-US"/>
           </a:p>
         </p:txBody>
       </p:sp>
@@ -1656,6 +1659,93 @@
 </file>
 
 <file path=ppt/notesSlides/notesSlide5.xml><?xml version="1.0" encoding="utf-8"?>
+<p:notes xmlns:a="http://schemas.openxmlformats.org/drawingml/2006/main" xmlns:r="http://schemas.openxmlformats.org/officeDocument/2006/relationships" xmlns:p="http://schemas.openxmlformats.org/presentationml/2006/main">
+  <p:cSld>
+    <p:spTree>
+      <p:nvGrpSpPr>
+        <p:cNvPr id="1" name=""/>
+        <p:cNvGrpSpPr/>
+        <p:nvPr/>
+      </p:nvGrpSpPr>
+      <p:grpSpPr>
+        <a:xfrm>
+          <a:off x="0" y="0"/>
+          <a:ext cx="0" cy="0"/>
+          <a:chOff x="0" y="0"/>
+          <a:chExt cx="0" cy="0"/>
+        </a:xfrm>
+      </p:grpSpPr>
+      <p:sp>
+        <p:nvSpPr>
+          <p:cNvPr id="80898" name="Slide Image Placeholder 1"/>
+          <p:cNvSpPr>
+            <a:spLocks noGrp="1" noRot="1" noChangeAspect="1" noTextEdit="1"/>
+          </p:cNvSpPr>
+          <p:nvPr>
+            <p:ph type="sldImg"/>
+          </p:nvPr>
+        </p:nvSpPr>
+        <p:spPr>
+          <a:ln/>
+        </p:spPr>
+      </p:sp>
+      <p:sp>
+        <p:nvSpPr>
+          <p:cNvPr id="80899" name="Notes Placeholder 2"/>
+          <p:cNvSpPr>
+            <a:spLocks noGrp="1"/>
+          </p:cNvSpPr>
+          <p:nvPr>
+            <p:ph type="body" idx="1"/>
+          </p:nvPr>
+        </p:nvSpPr>
+        <p:spPr>
+          <a:noFill/>
+          <a:ln/>
+        </p:spPr>
+        <p:txBody>
+          <a:bodyPr/>
+          <a:lstStyle/>
+          <a:p>
+            <a:endParaRPr lang="en-US" smtClean="0"/>
+          </a:p>
+        </p:txBody>
+      </p:sp>
+      <p:sp>
+        <p:nvSpPr>
+          <p:cNvPr id="80900" name="Slide Number Placeholder 3"/>
+          <p:cNvSpPr>
+            <a:spLocks noGrp="1"/>
+          </p:cNvSpPr>
+          <p:nvPr>
+            <p:ph type="sldNum" sz="quarter" idx="5"/>
+          </p:nvPr>
+        </p:nvSpPr>
+        <p:spPr>
+          <a:noFill/>
+        </p:spPr>
+        <p:txBody>
+          <a:bodyPr/>
+          <a:lstStyle/>
+          <a:p>
+            <a:fld id="{B6C9B5E5-857B-4897-A1D5-E0801B03E2E1}" type="slidenum">
+              <a:rPr lang="en-US" smtClean="0"/>
+              <a:pPr/>
+              <a:t>8</a:t>
+            </a:fld>
+            <a:endParaRPr lang="en-US" smtClean="0"/>
+          </a:p>
+        </p:txBody>
+      </p:sp>
+    </p:spTree>
+  </p:cSld>
+  <p:clrMapOvr>
+    <a:masterClrMapping/>
+  </p:clrMapOvr>
+</p:notes>
+</file>
+
+<file path=ppt/notesSlides/notesSlide6.xml><?xml version="1.0" encoding="utf-8"?>
 <p:notes xmlns:a="http://schemas.openxmlformats.org/drawingml/2006/main" xmlns:r="http://schemas.openxmlformats.org/officeDocument/2006/relationships" xmlns:p="http://schemas.openxmlformats.org/presentationml/2006/main">
   <p:cSld>
     <p:bg>
@@ -1817,7 +1907,7 @@
 </p:notes>
 </file>
 
-<file path=ppt/notesSlides/notesSlide6.xml><?xml version="1.0" encoding="utf-8"?>
+<file path=ppt/notesSlides/notesSlide7.xml><?xml version="1.0" encoding="utf-8"?>
 <p:notes xmlns:a="http://schemas.openxmlformats.org/drawingml/2006/main" xmlns:r="http://schemas.openxmlformats.org/officeDocument/2006/relationships" xmlns:p="http://schemas.openxmlformats.org/presentationml/2006/main">
   <p:cSld>
     <p:bg>
@@ -1936,7 +2026,7 @@
 </p:notes>
 </file>
 
-<file path=ppt/notesSlides/notesSlide7.xml><?xml version="1.0" encoding="utf-8"?>
+<file path=ppt/notesSlides/notesSlide8.xml><?xml version="1.0" encoding="utf-8"?>
 <p:notes xmlns:a="http://schemas.openxmlformats.org/drawingml/2006/main" xmlns:r="http://schemas.openxmlformats.org/officeDocument/2006/relationships" xmlns:p="http://schemas.openxmlformats.org/presentationml/2006/main">
   <p:cSld>
     <p:spTree>
@@ -2207,7 +2297,7 @@
             </a:pPr>
             <a:fld id="{7A2110C6-42E6-C249-AB93-39D6DA2064F9}" type="datetime1">
               <a:rPr lang="en-US" smtClean="0"/>
-              <a:t>9/15/12</a:t>
+              <a:t>11/8/12</a:t>
             </a:fld>
             <a:endParaRPr lang="en-US" dirty="0"/>
           </a:p>
@@ -2394,7 +2484,7 @@
             </a:pPr>
             <a:fld id="{5E77C6FB-E2F0-434B-8B69-F6C1C8DB6F45}" type="datetime1">
               <a:rPr lang="en-US" smtClean="0"/>
-              <a:t>9/15/12</a:t>
+              <a:t>11/8/12</a:t>
             </a:fld>
             <a:endParaRPr lang="en-US" dirty="0"/>
           </a:p>
@@ -2655,7 +2745,7 @@
             </a:pPr>
             <a:fld id="{7FE85A71-1CC0-5A44-BBFE-D44CF2B0ECEB}" type="datetime1">
               <a:rPr lang="en-US" smtClean="0"/>
-              <a:t>9/15/12</a:t>
+              <a:t>11/8/12</a:t>
             </a:fld>
             <a:endParaRPr lang="en-US" dirty="0"/>
           </a:p>
@@ -2854,7 +2944,7 @@
             </a:pPr>
             <a:fld id="{087B731E-3700-334E-9CC3-C168566E9AA0}" type="datetime1">
               <a:rPr lang="en-US" smtClean="0"/>
-              <a:t>9/15/12</a:t>
+              <a:t>11/8/12</a:t>
             </a:fld>
             <a:endParaRPr lang="en-US" dirty="0"/>
           </a:p>
@@ -2989,7 +3079,7 @@
             </a:pPr>
             <a:fld id="{0842E845-D8E2-894E-BB34-38A8F680737E}" type="datetime1">
               <a:rPr lang="en-US" smtClean="0"/>
-              <a:t>9/15/12</a:t>
+              <a:t>11/8/12</a:t>
             </a:fld>
             <a:endParaRPr lang="en-US" dirty="0"/>
           </a:p>
@@ -3176,7 +3266,7 @@
             </a:pPr>
             <a:fld id="{A5C62857-006E-CC44-9123-D4118CC337CD}" type="datetime1">
               <a:rPr lang="en-US" smtClean="0"/>
-              <a:t>9/15/12</a:t>
+              <a:t>11/8/12</a:t>
             </a:fld>
             <a:endParaRPr lang="en-US" dirty="0"/>
           </a:p>
@@ -3439,7 +3529,7 @@
             </a:pPr>
             <a:fld id="{C1A7FCE9-11CE-D84A-A294-4377EAA2E1F4}" type="datetime1">
               <a:rPr lang="en-US" smtClean="0"/>
-              <a:t>9/15/12</a:t>
+              <a:t>11/8/12</a:t>
             </a:fld>
             <a:endParaRPr lang="en-US" dirty="0"/>
           </a:p>
@@ -3744,7 +3834,7 @@
             </a:pPr>
             <a:fld id="{754AEBAF-9D99-9846-8683-E561E196B0D1}" type="datetime1">
               <a:rPr lang="en-US" smtClean="0"/>
-              <a:t>9/15/12</a:t>
+              <a:t>11/8/12</a:t>
             </a:fld>
             <a:endParaRPr lang="en-US" dirty="0"/>
           </a:p>
@@ -4183,7 +4273,7 @@
             </a:pPr>
             <a:fld id="{B1689200-2A9C-FC4C-8D92-E33F187B9275}" type="datetime1">
               <a:rPr lang="en-US" smtClean="0"/>
-              <a:t>9/15/12</a:t>
+              <a:t>11/8/12</a:t>
             </a:fld>
             <a:endParaRPr lang="en-US" dirty="0"/>
           </a:p>
@@ -4318,7 +4408,7 @@
             </a:pPr>
             <a:fld id="{9ABA94AB-F13B-A549-8674-E34A85A6617F}" type="datetime1">
               <a:rPr lang="en-US" smtClean="0"/>
-              <a:t>9/15/12</a:t>
+              <a:t>11/8/12</a:t>
             </a:fld>
             <a:endParaRPr lang="en-US" dirty="0"/>
           </a:p>
@@ -4430,7 +4520,7 @@
             </a:pPr>
             <a:fld id="{11871FCB-95DD-314A-8321-2E00AFEA7C90}" type="datetime1">
               <a:rPr lang="en-US" smtClean="0"/>
-              <a:t>9/15/12</a:t>
+              <a:t>11/8/12</a:t>
             </a:fld>
             <a:endParaRPr lang="en-US" dirty="0"/>
           </a:p>
@@ -4724,7 +4814,7 @@
             </a:pPr>
             <a:fld id="{EFB6C0F3-D96D-814E-8974-3EF042E33295}" type="datetime1">
               <a:rPr lang="en-US" smtClean="0"/>
-              <a:t>9/15/12</a:t>
+              <a:t>11/8/12</a:t>
             </a:fld>
             <a:endParaRPr lang="en-US" dirty="0"/>
           </a:p>
@@ -5002,7 +5092,7 @@
             </a:pPr>
             <a:fld id="{34693D2E-6330-EB47-94B5-0B8F470949B9}" type="datetime1">
               <a:rPr lang="en-US" smtClean="0"/>
-              <a:t>9/15/12</a:t>
+              <a:t>11/8/12</a:t>
             </a:fld>
             <a:endParaRPr lang="en-US" dirty="0"/>
           </a:p>
@@ -5298,7 +5388,7 @@
             </a:pPr>
             <a:fld id="{BB61BB25-586D-C945-A59D-FABA2AA6DA78}" type="datetime1">
               <a:rPr lang="en-US" smtClean="0"/>
-              <a:t>9/15/12</a:t>
+              <a:t>11/8/12</a:t>
             </a:fld>
             <a:endParaRPr lang="en-US" dirty="0"/>
           </a:p>
@@ -5753,7 +5843,7 @@
           <a:lstStyle/>
           <a:p>
             <a:r>
-              <a:rPr lang="en-US"/>
+              <a:rPr lang="en-US" dirty="0"/>
               <a:t>Molecular Dynamics in NAMD</a:t>
             </a:r>
           </a:p>
@@ -5838,37 +5928,41 @@
           <a:p>
             <a:pPr lvl="2"/>
             <a:r>
-              <a:rPr lang="en-US" sz="2000" dirty="0"/>
+              <a:rPr lang="en-US" sz="2000" dirty="0" smtClean="0"/>
               <a:t>Non-bonded: electrostatic and van der Waal</a:t>
             </a:r>
             <a:r>
-              <a:rPr lang="ja-JP" altLang="en-US" sz="2000" dirty="0">
+              <a:rPr lang="ja-JP" altLang="en-US" sz="2000" dirty="0" smtClean="0">
                 <a:latin typeface="Arial"/>
               </a:rPr>
               <a:t>’</a:t>
             </a:r>
             <a:r>
-              <a:rPr lang="en-US" sz="2000" dirty="0"/>
+              <a:rPr lang="en-US" sz="2000" dirty="0" smtClean="0"/>
               <a:t>s</a:t>
             </a:r>
           </a:p>
           <a:p>
             <a:pPr lvl="3"/>
             <a:r>
+              <a:rPr lang="en-US" sz="1800" dirty="0" smtClean="0"/>
+              <a:t>Short-distance: every </a:t>
+            </a:r>
+            <a:r>
+              <a:rPr lang="en-US" sz="1800" dirty="0" err="1" smtClean="0"/>
+              <a:t>timestep</a:t>
+            </a:r>
+            <a:endParaRPr lang="en-US" sz="1800" dirty="0" smtClean="0"/>
+          </a:p>
+          <a:p>
+            <a:pPr lvl="3"/>
+            <a:r>
+              <a:rPr lang="en-US" sz="1800" dirty="0" smtClean="0"/>
+              <a:t>Long</a:t>
+            </a:r>
+            <a:r>
               <a:rPr lang="en-US" sz="1800" dirty="0"/>
-              <a:t>Short-distance: every </a:t>
-            </a:r>
-            <a:r>
-              <a:rPr lang="en-US" sz="1800" dirty="0" err="1"/>
-              <a:t>timestep</a:t>
-            </a:r>
-            <a:endParaRPr lang="en-US" sz="1800" dirty="0"/>
-          </a:p>
-          <a:p>
-            <a:pPr lvl="3"/>
-            <a:r>
-              <a:rPr lang="en-US" sz="1800" dirty="0"/>
-              <a:t>Long-distance: using PME (3D FFT)</a:t>
+              <a:t>-distance: using PME (3D FFT)</a:t>
             </a:r>
           </a:p>
           <a:p>
@@ -6034,7 +6128,7 @@
         </p:blipFill>
         <p:spPr bwMode="auto">
           <a:xfrm>
-            <a:off x="6553200" y="1524000"/>
+            <a:off x="6934200" y="1524000"/>
             <a:ext cx="2590800" cy="3145971"/>
           </a:xfrm>
           <a:prstGeom prst="rect">
@@ -6706,9 +6800,6 @@
               </a:rPr>
               <a:t>)</a:t>
             </a:r>
-            <a:endParaRPr lang="en-US" sz="2000" dirty="0" smtClean="0">
-              <a:latin typeface="Book Antiqua" pitchFamily="18" charset="0"/>
-            </a:endParaRPr>
           </a:p>
         </p:txBody>
       </p:sp>
@@ -6911,7 +7002,7 @@
           <a:p>
             <a:fld id="{0D924910-37C4-934A-9CCF-7C783E34B8F9}" type="datetime1">
               <a:rPr lang="en-US" smtClean="0"/>
-              <a:t>9/15/12</a:t>
+              <a:t>11/8/12</a:t>
             </a:fld>
             <a:endParaRPr lang="en-US" dirty="0"/>
           </a:p>
@@ -7174,7 +7265,7 @@
           <a:p>
             <a:fld id="{7D2E0B17-4561-2B48-BD73-FDB0A6906B77}" type="datetime1">
               <a:rPr lang="en-US" smtClean="0"/>
-              <a:t>9/15/12</a:t>
+              <a:t>11/8/12</a:t>
             </a:fld>
             <a:endParaRPr lang="en-US" dirty="0"/>
           </a:p>
@@ -7308,7 +7399,7 @@
           <a:lstStyle/>
           <a:p>
             <a:r>
-              <a:rPr lang="en-US"/>
+              <a:rPr lang="en-US" dirty="0"/>
               <a:t>Spatial Decomposition Via Charm</a:t>
             </a:r>
           </a:p>
@@ -7800,11 +7891,13 @@
               </a:avLst>
             </a:prstGeom>
             <a:solidFill>
-              <a:srgbClr val="FFFF99"/>
+              <a:schemeClr val="accent3">
+                <a:lumMod val="75000"/>
+              </a:schemeClr>
             </a:solidFill>
             <a:ln w="12700" cap="sq">
               <a:solidFill>
-                <a:schemeClr val="tx1"/>
+                <a:srgbClr val="F19E91"/>
               </a:solidFill>
               <a:miter lim="800000"/>
               <a:headEnd type="none" w="sm" len="sm"/>
@@ -7853,11 +7946,13 @@
               </a:avLst>
             </a:prstGeom>
             <a:solidFill>
-              <a:srgbClr val="FFFF00"/>
+              <a:schemeClr val="accent3">
+                <a:lumMod val="75000"/>
+              </a:schemeClr>
             </a:solidFill>
             <a:ln w="12700" cap="sq">
               <a:solidFill>
-                <a:schemeClr val="tx1"/>
+                <a:srgbClr val="F19E91"/>
               </a:solidFill>
               <a:miter lim="800000"/>
               <a:headEnd type="none" w="sm" len="sm"/>
@@ -7906,11 +8001,13 @@
               </a:avLst>
             </a:prstGeom>
             <a:solidFill>
-              <a:srgbClr val="FFFF00"/>
+              <a:schemeClr val="accent3">
+                <a:lumMod val="75000"/>
+              </a:schemeClr>
             </a:solidFill>
             <a:ln w="12700" cap="sq">
               <a:solidFill>
-                <a:schemeClr val="tx1"/>
+                <a:srgbClr val="F19E91"/>
               </a:solidFill>
               <a:miter lim="800000"/>
               <a:headEnd type="none" w="sm" len="sm"/>
@@ -7959,11 +8056,13 @@
               </a:avLst>
             </a:prstGeom>
             <a:solidFill>
-              <a:srgbClr val="FFFF00"/>
+              <a:schemeClr val="accent3">
+                <a:lumMod val="75000"/>
+              </a:schemeClr>
             </a:solidFill>
             <a:ln w="12700" cap="sq">
               <a:solidFill>
-                <a:schemeClr val="tx1"/>
+                <a:srgbClr val="F19E91"/>
               </a:solidFill>
               <a:miter lim="800000"/>
               <a:headEnd type="none" w="sm" len="sm"/>
@@ -8011,7 +8110,9 @@
             <a:noFill/>
             <a:ln w="76200" cap="sq">
               <a:solidFill>
-                <a:srgbClr val="FFFF00"/>
+                <a:schemeClr val="bg2">
+                  <a:lumMod val="25000"/>
+                </a:schemeClr>
               </a:solidFill>
               <a:round/>
               <a:headEnd type="triangle" w="sm" len="sm"/>
@@ -8064,7 +8165,9 @@
             <a:noFill/>
             <a:ln w="76200" cap="sq">
               <a:solidFill>
-                <a:srgbClr val="FFFF00"/>
+                <a:schemeClr val="bg2">
+                  <a:lumMod val="25000"/>
+                </a:schemeClr>
               </a:solidFill>
               <a:round/>
               <a:headEnd type="triangle" w="sm" len="sm"/>
@@ -8117,7 +8220,9 @@
             <a:noFill/>
             <a:ln w="76200" cap="sq">
               <a:solidFill>
-                <a:srgbClr val="FFFF00"/>
+                <a:schemeClr val="bg2">
+                  <a:lumMod val="25000"/>
+                </a:schemeClr>
               </a:solidFill>
               <a:round/>
               <a:headEnd type="triangle" w="sm" len="sm"/>
@@ -8170,7 +8275,9 @@
             <a:noFill/>
             <a:ln w="76200" cap="sq">
               <a:solidFill>
-                <a:srgbClr val="FFFF00"/>
+                <a:schemeClr val="bg2">
+                  <a:lumMod val="25000"/>
+                </a:schemeClr>
               </a:solidFill>
               <a:round/>
               <a:headEnd type="triangle" w="sm" len="sm"/>
@@ -8274,7 +8381,7 @@
               <a:buChar char="•"/>
             </a:pPr>
             <a:r>
-              <a:rPr lang="en-US" sz="2000"/>
+              <a:rPr lang="en-US" sz="2000" dirty="0"/>
               <a:t>Atoms distributed to cubes based on their location</a:t>
             </a:r>
           </a:p>
@@ -8290,7 +8397,7 @@
               <a:buChar char="•"/>
             </a:pPr>
             <a:r>
-              <a:rPr lang="en-US" sz="2000"/>
+              <a:rPr lang="en-US" sz="2000" dirty="0"/>
               <a:t> Size of each cube :</a:t>
             </a:r>
           </a:p>
@@ -8306,7 +8413,7 @@
               <a:buChar char="•"/>
             </a:pPr>
             <a:r>
-              <a:rPr lang="en-US" sz="2000"/>
+              <a:rPr lang="en-US" sz="2000" dirty="0"/>
               <a:t>Just a bit larger than cut-off radius</a:t>
             </a:r>
           </a:p>
@@ -8322,7 +8429,7 @@
               <a:buChar char="•"/>
             </a:pPr>
             <a:r>
-              <a:rPr lang="en-US" sz="2000"/>
+              <a:rPr lang="en-US" sz="2000" dirty="0"/>
               <a:t>Communicate only with neighbors</a:t>
             </a:r>
           </a:p>
@@ -8338,8 +8445,16 @@
               <a:buChar char="•"/>
             </a:pPr>
             <a:r>
-              <a:rPr lang="en-US" sz="2000"/>
-              <a:t>Work: for each pair of nbr objects</a:t>
+              <a:rPr lang="en-US" sz="2000" dirty="0"/>
+              <a:t>Work: for each pair of </a:t>
+            </a:r>
+            <a:r>
+              <a:rPr lang="en-US" sz="2000" dirty="0" err="1"/>
+              <a:t>nbr</a:t>
+            </a:r>
+            <a:r>
+              <a:rPr lang="en-US" sz="2000" dirty="0"/>
+              <a:t> objects</a:t>
             </a:r>
           </a:p>
           <a:p>
@@ -8354,7 +8469,7 @@
               <a:buChar char="•"/>
             </a:pPr>
             <a:r>
-              <a:rPr lang="en-US" sz="2000"/>
+              <a:rPr lang="en-US" sz="2000" dirty="0"/>
               <a:t>C/C ratio: O(1)</a:t>
             </a:r>
           </a:p>
@@ -8370,7 +8485,7 @@
               <a:buChar char="•"/>
             </a:pPr>
             <a:r>
-              <a:rPr lang="en-US" sz="2000" b="1" i="1">
+              <a:rPr lang="en-US" sz="2000" b="1" i="1" dirty="0">
                 <a:solidFill>
                   <a:schemeClr val="tx2"/>
                 </a:solidFill>
@@ -8390,7 +8505,7 @@
               <a:buChar char="•"/>
             </a:pPr>
             <a:r>
-              <a:rPr lang="en-US" sz="2000" b="1" i="1">
+              <a:rPr lang="en-US" sz="2000" b="1" i="1" dirty="0">
                 <a:solidFill>
                   <a:schemeClr val="tx2"/>
                 </a:solidFill>
@@ -8410,7 +8525,7 @@
               <a:buChar char="•"/>
             </a:pPr>
             <a:r>
-              <a:rPr lang="en-US" sz="2000" b="1" i="1">
+              <a:rPr lang="en-US" sz="2000" b="1" i="1" dirty="0">
                 <a:solidFill>
                   <a:schemeClr val="tx2"/>
                 </a:solidFill>
@@ -8429,7 +8544,7 @@
               <a:buFontTx/>
               <a:buChar char="•"/>
             </a:pPr>
-            <a:endParaRPr lang="en-US" sz="2000" b="1" i="1">
+            <a:endParaRPr lang="en-US" sz="2000" b="1" i="1" dirty="0">
               <a:solidFill>
                 <a:schemeClr val="tx2"/>
               </a:solidFill>
@@ -8502,7 +8617,7 @@
               </a:spcBef>
             </a:pPr>
             <a:r>
-              <a:rPr lang="en-US" sz="2000">
+              <a:rPr lang="en-US" sz="2000" dirty="0">
                 <a:solidFill>
                   <a:schemeClr val="accent1"/>
                 </a:solidFill>
@@ -8510,7 +8625,7 @@
               <a:t>Cells, Cubes or</a:t>
             </a:r>
             <a:r>
-              <a:rPr lang="ja-JP" altLang="en-US" sz="2000">
+              <a:rPr lang="ja-JP" altLang="en-US" sz="2000" dirty="0">
                 <a:solidFill>
                   <a:schemeClr val="accent1"/>
                 </a:solidFill>
@@ -8519,7 +8634,7 @@
               <a:t>“</a:t>
             </a:r>
             <a:r>
-              <a:rPr lang="en-US" sz="2000">
+              <a:rPr lang="en-US" sz="2000" dirty="0">
                 <a:solidFill>
                   <a:schemeClr val="accent1"/>
                 </a:solidFill>
@@ -8527,7 +8642,7 @@
               <a:t>Patches</a:t>
             </a:r>
             <a:r>
-              <a:rPr lang="ja-JP" altLang="en-US" sz="2000">
+              <a:rPr lang="ja-JP" altLang="en-US" sz="2000" dirty="0">
                 <a:solidFill>
                   <a:schemeClr val="accent1"/>
                 </a:solidFill>
@@ -8535,7 +8650,7 @@
               </a:rPr>
               <a:t>”</a:t>
             </a:r>
-            <a:endParaRPr lang="en-US" sz="2000">
+            <a:endParaRPr lang="en-US" sz="2000" dirty="0">
               <a:solidFill>
                 <a:schemeClr val="accent1"/>
               </a:solidFill>
@@ -8957,1824 +9072,1757 @@
           </a:p>
         </p:txBody>
       </p:sp>
-      <p:grpSp>
-        <p:nvGrpSpPr>
-          <p:cNvPr id="441347" name="Group 3"/>
-          <p:cNvGrpSpPr>
-            <a:grpSpLocks/>
-          </p:cNvGrpSpPr>
+      <p:sp>
+        <p:nvSpPr>
+          <p:cNvPr id="441348" name="Rectangle 4"/>
+          <p:cNvSpPr>
+            <a:spLocks noChangeArrowheads="1"/>
+          </p:cNvSpPr>
           <p:nvPr/>
-        </p:nvGrpSpPr>
-        <p:grpSpPr bwMode="auto">
+        </p:nvSpPr>
+        <p:spPr bwMode="auto">
           <a:xfrm>
-            <a:off x="381000" y="2209800"/>
-            <a:ext cx="3886200" cy="3581400"/>
-            <a:chOff x="1056" y="1200"/>
-            <a:chExt cx="3744" cy="2928"/>
+            <a:off x="518746" y="2286000"/>
+            <a:ext cx="548054" cy="645826"/>
           </a:xfrm>
-        </p:grpSpPr>
-        <p:sp>
-          <p:nvSpPr>
-            <p:cNvPr id="441348" name="Rectangle 4"/>
-            <p:cNvSpPr>
-              <a:spLocks noChangeArrowheads="1"/>
-            </p:cNvSpPr>
-            <p:nvPr/>
-          </p:nvSpPr>
-          <p:spPr bwMode="auto">
-            <a:xfrm>
-              <a:off x="1056" y="1200"/>
-              <a:ext cx="528" cy="528"/>
-            </a:xfrm>
-            <a:prstGeom prst="rect">
-              <a:avLst/>
-            </a:prstGeom>
+          <a:prstGeom prst="rect">
+            <a:avLst/>
+          </a:prstGeom>
+          <a:solidFill>
+            <a:schemeClr val="accent1"/>
+          </a:solidFill>
+          <a:ln w="12700" cap="sq">
             <a:solidFill>
-              <a:schemeClr val="accent1"/>
+              <a:schemeClr val="tx1"/>
             </a:solidFill>
-            <a:ln w="12700" cap="sq">
-              <a:solidFill>
-                <a:schemeClr val="tx1"/>
-              </a:solidFill>
-              <a:miter lim="800000"/>
-              <a:headEnd type="none" w="sm" len="sm"/>
-              <a:tailEnd type="none" w="sm" len="sm"/>
-            </a:ln>
-            <a:effectLst/>
-            <a:extLst>
-              <a:ext uri="{AF507438-7753-43e0-B8FC-AC1667EBCBE1}">
-                <a14:hiddenEffects xmlns:a14="http://schemas.microsoft.com/office/drawing/2010/main">
-                  <a:effectLst>
-                    <a:outerShdw blurRad="63500" dist="38099" dir="2700000" algn="ctr" rotWithShape="0">
-                      <a:schemeClr val="bg2">
-                        <a:alpha val="74998"/>
-                      </a:schemeClr>
-                    </a:outerShdw>
-                  </a:effectLst>
-                </a14:hiddenEffects>
-              </a:ext>
-            </a:extLst>
-          </p:spPr>
-          <p:txBody>
-            <a:bodyPr wrap="none" anchor="ctr"/>
-            <a:lstStyle/>
-            <a:p>
-              <a:endParaRPr lang="en-US"/>
-            </a:p>
-          </p:txBody>
-        </p:sp>
-        <p:sp>
-          <p:nvSpPr>
-            <p:cNvPr id="441349" name="Rectangle 5"/>
-            <p:cNvSpPr>
-              <a:spLocks noChangeArrowheads="1"/>
-            </p:cNvSpPr>
-            <p:nvPr/>
-          </p:nvSpPr>
-          <p:spPr bwMode="auto">
-            <a:xfrm>
-              <a:off x="2736" y="1200"/>
-              <a:ext cx="528" cy="528"/>
-            </a:xfrm>
-            <a:prstGeom prst="rect">
-              <a:avLst/>
-            </a:prstGeom>
+            <a:miter lim="800000"/>
+            <a:headEnd type="none" w="sm" len="sm"/>
+            <a:tailEnd type="none" w="sm" len="sm"/>
+          </a:ln>
+          <a:effectLst/>
+          <a:extLst>
+            <a:ext uri="{AF507438-7753-43e0-B8FC-AC1667EBCBE1}">
+              <a14:hiddenEffects xmlns:a14="http://schemas.microsoft.com/office/drawing/2010/main">
+                <a:effectLst>
+                  <a:outerShdw blurRad="63500" dist="38099" dir="2700000" algn="ctr" rotWithShape="0">
+                    <a:schemeClr val="bg2">
+                      <a:alpha val="74998"/>
+                    </a:schemeClr>
+                  </a:outerShdw>
+                </a:effectLst>
+              </a14:hiddenEffects>
+            </a:ext>
+          </a:extLst>
+        </p:spPr>
+        <p:txBody>
+          <a:bodyPr wrap="none" anchor="ctr"/>
+          <a:lstStyle/>
+          <a:p>
+            <a:endParaRPr lang="en-US"/>
+          </a:p>
+        </p:txBody>
+      </p:sp>
+      <p:sp>
+        <p:nvSpPr>
+          <p:cNvPr id="441349" name="Rectangle 5"/>
+          <p:cNvSpPr>
+            <a:spLocks noChangeArrowheads="1"/>
+          </p:cNvSpPr>
+          <p:nvPr/>
+        </p:nvSpPr>
+        <p:spPr bwMode="auto">
+          <a:xfrm>
+            <a:off x="2124808" y="2209800"/>
+            <a:ext cx="548054" cy="645826"/>
+          </a:xfrm>
+          <a:prstGeom prst="rect">
+            <a:avLst/>
+          </a:prstGeom>
+          <a:solidFill>
+            <a:schemeClr val="accent1"/>
+          </a:solidFill>
+          <a:ln w="12700" cap="sq">
             <a:solidFill>
-              <a:schemeClr val="accent1"/>
+              <a:schemeClr val="tx1"/>
             </a:solidFill>
-            <a:ln w="12700" cap="sq">
-              <a:solidFill>
-                <a:schemeClr val="tx1"/>
-              </a:solidFill>
-              <a:miter lim="800000"/>
-              <a:headEnd type="none" w="sm" len="sm"/>
-              <a:tailEnd type="none" w="sm" len="sm"/>
-            </a:ln>
-            <a:effectLst/>
-            <a:extLst>
-              <a:ext uri="{AF507438-7753-43e0-B8FC-AC1667EBCBE1}">
-                <a14:hiddenEffects xmlns:a14="http://schemas.microsoft.com/office/drawing/2010/main">
-                  <a:effectLst>
-                    <a:outerShdw blurRad="63500" dist="38099" dir="2700000" algn="ctr" rotWithShape="0">
-                      <a:schemeClr val="bg2">
-                        <a:alpha val="74998"/>
-                      </a:schemeClr>
-                    </a:outerShdw>
-                  </a:effectLst>
-                </a14:hiddenEffects>
-              </a:ext>
-            </a:extLst>
-          </p:spPr>
-          <p:txBody>
-            <a:bodyPr wrap="none" anchor="ctr"/>
-            <a:lstStyle/>
-            <a:p>
-              <a:endParaRPr lang="en-US"/>
-            </a:p>
-          </p:txBody>
-        </p:sp>
-        <p:sp>
-          <p:nvSpPr>
-            <p:cNvPr id="441350" name="Rectangle 6"/>
-            <p:cNvSpPr>
-              <a:spLocks noChangeArrowheads="1"/>
-            </p:cNvSpPr>
-            <p:nvPr/>
-          </p:nvSpPr>
-          <p:spPr bwMode="auto">
-            <a:xfrm>
-              <a:off x="4272" y="1200"/>
-              <a:ext cx="528" cy="528"/>
-            </a:xfrm>
-            <a:prstGeom prst="rect">
-              <a:avLst/>
-            </a:prstGeom>
+            <a:miter lim="800000"/>
+            <a:headEnd type="none" w="sm" len="sm"/>
+            <a:tailEnd type="none" w="sm" len="sm"/>
+          </a:ln>
+          <a:effectLst/>
+          <a:extLst>
+            <a:ext uri="{AF507438-7753-43e0-B8FC-AC1667EBCBE1}">
+              <a14:hiddenEffects xmlns:a14="http://schemas.microsoft.com/office/drawing/2010/main">
+                <a:effectLst>
+                  <a:outerShdw blurRad="63500" dist="38099" dir="2700000" algn="ctr" rotWithShape="0">
+                    <a:schemeClr val="bg2">
+                      <a:alpha val="74998"/>
+                    </a:schemeClr>
+                  </a:outerShdw>
+                </a:effectLst>
+              </a14:hiddenEffects>
+            </a:ext>
+          </a:extLst>
+        </p:spPr>
+        <p:txBody>
+          <a:bodyPr wrap="none" anchor="ctr"/>
+          <a:lstStyle/>
+          <a:p>
+            <a:endParaRPr lang="en-US"/>
+          </a:p>
+        </p:txBody>
+      </p:sp>
+      <p:sp>
+        <p:nvSpPr>
+          <p:cNvPr id="441350" name="Rectangle 6"/>
+          <p:cNvSpPr>
+            <a:spLocks noChangeArrowheads="1"/>
+          </p:cNvSpPr>
+          <p:nvPr/>
+        </p:nvSpPr>
+        <p:spPr bwMode="auto">
+          <a:xfrm>
+            <a:off x="3719146" y="2325974"/>
+            <a:ext cx="548054" cy="645826"/>
+          </a:xfrm>
+          <a:prstGeom prst="rect">
+            <a:avLst/>
+          </a:prstGeom>
+          <a:solidFill>
+            <a:schemeClr val="accent1"/>
+          </a:solidFill>
+          <a:ln w="12700" cap="sq">
             <a:solidFill>
-              <a:schemeClr val="accent1"/>
+              <a:schemeClr val="tx1"/>
             </a:solidFill>
-            <a:ln w="12700" cap="sq">
-              <a:solidFill>
-                <a:schemeClr val="tx1"/>
-              </a:solidFill>
-              <a:miter lim="800000"/>
-              <a:headEnd type="none" w="sm" len="sm"/>
-              <a:tailEnd type="none" w="sm" len="sm"/>
-            </a:ln>
-            <a:effectLst/>
-            <a:extLst>
-              <a:ext uri="{AF507438-7753-43e0-B8FC-AC1667EBCBE1}">
-                <a14:hiddenEffects xmlns:a14="http://schemas.microsoft.com/office/drawing/2010/main">
-                  <a:effectLst>
-                    <a:outerShdw blurRad="63500" dist="38099" dir="2700000" algn="ctr" rotWithShape="0">
-                      <a:schemeClr val="bg2">
-                        <a:alpha val="74998"/>
-                      </a:schemeClr>
-                    </a:outerShdw>
-                  </a:effectLst>
-                </a14:hiddenEffects>
-              </a:ext>
-            </a:extLst>
-          </p:spPr>
-          <p:txBody>
-            <a:bodyPr wrap="none" anchor="ctr"/>
-            <a:lstStyle/>
-            <a:p>
-              <a:endParaRPr lang="en-US"/>
-            </a:p>
-          </p:txBody>
-        </p:sp>
-        <p:sp>
-          <p:nvSpPr>
-            <p:cNvPr id="441351" name="Rectangle 7"/>
-            <p:cNvSpPr>
-              <a:spLocks noChangeArrowheads="1"/>
-            </p:cNvSpPr>
-            <p:nvPr/>
-          </p:nvSpPr>
-          <p:spPr bwMode="auto">
-            <a:xfrm>
-              <a:off x="2736" y="2400"/>
-              <a:ext cx="528" cy="528"/>
-            </a:xfrm>
-            <a:prstGeom prst="rect">
-              <a:avLst/>
-            </a:prstGeom>
+            <a:miter lim="800000"/>
+            <a:headEnd type="none" w="sm" len="sm"/>
+            <a:tailEnd type="none" w="sm" len="sm"/>
+          </a:ln>
+          <a:effectLst/>
+          <a:extLst>
+            <a:ext uri="{AF507438-7753-43e0-B8FC-AC1667EBCBE1}">
+              <a14:hiddenEffects xmlns:a14="http://schemas.microsoft.com/office/drawing/2010/main">
+                <a:effectLst>
+                  <a:outerShdw blurRad="63500" dist="38099" dir="2700000" algn="ctr" rotWithShape="0">
+                    <a:schemeClr val="bg2">
+                      <a:alpha val="74998"/>
+                    </a:schemeClr>
+                  </a:outerShdw>
+                </a:effectLst>
+              </a14:hiddenEffects>
+            </a:ext>
+          </a:extLst>
+        </p:spPr>
+        <p:txBody>
+          <a:bodyPr wrap="none" anchor="ctr"/>
+          <a:lstStyle/>
+          <a:p>
+            <a:endParaRPr lang="en-US"/>
+          </a:p>
+        </p:txBody>
+      </p:sp>
+      <p:sp>
+        <p:nvSpPr>
+          <p:cNvPr id="441351" name="Rectangle 7"/>
+          <p:cNvSpPr>
+            <a:spLocks noChangeArrowheads="1"/>
+          </p:cNvSpPr>
+          <p:nvPr/>
+        </p:nvSpPr>
+        <p:spPr bwMode="auto">
+          <a:xfrm>
+            <a:off x="2124808" y="3677587"/>
+            <a:ext cx="548054" cy="645826"/>
+          </a:xfrm>
+          <a:prstGeom prst="rect">
+            <a:avLst/>
+          </a:prstGeom>
+          <a:solidFill>
+            <a:srgbClr val="FF6600"/>
+          </a:solidFill>
+          <a:ln w="12700" cap="sq">
             <a:solidFill>
-              <a:srgbClr val="FF6600"/>
+              <a:schemeClr val="tx1"/>
             </a:solidFill>
-            <a:ln w="12700" cap="sq">
-              <a:solidFill>
-                <a:schemeClr val="tx1"/>
-              </a:solidFill>
-              <a:miter lim="800000"/>
-              <a:headEnd type="none" w="sm" len="sm"/>
-              <a:tailEnd type="none" w="sm" len="sm"/>
-            </a:ln>
-            <a:effectLst/>
-            <a:extLst>
-              <a:ext uri="{AF507438-7753-43e0-B8FC-AC1667EBCBE1}">
-                <a14:hiddenEffects xmlns:a14="http://schemas.microsoft.com/office/drawing/2010/main">
-                  <a:effectLst>
-                    <a:outerShdw blurRad="63500" dist="38099" dir="2700000" algn="ctr" rotWithShape="0">
-                      <a:schemeClr val="bg2">
-                        <a:alpha val="74998"/>
-                      </a:schemeClr>
-                    </a:outerShdw>
-                  </a:effectLst>
-                </a14:hiddenEffects>
-              </a:ext>
-            </a:extLst>
-          </p:spPr>
-          <p:txBody>
-            <a:bodyPr wrap="none" anchor="ctr"/>
-            <a:lstStyle/>
-            <a:p>
-              <a:endParaRPr lang="en-US"/>
-            </a:p>
-          </p:txBody>
-        </p:sp>
-        <p:sp>
-          <p:nvSpPr>
-            <p:cNvPr id="441352" name="Rectangle 8"/>
-            <p:cNvSpPr>
-              <a:spLocks noChangeArrowheads="1"/>
-            </p:cNvSpPr>
-            <p:nvPr/>
-          </p:nvSpPr>
-          <p:spPr bwMode="auto">
-            <a:xfrm>
-              <a:off x="1056" y="2352"/>
-              <a:ext cx="528" cy="528"/>
-            </a:xfrm>
-            <a:prstGeom prst="rect">
-              <a:avLst/>
-            </a:prstGeom>
+            <a:miter lim="800000"/>
+            <a:headEnd type="none" w="sm" len="sm"/>
+            <a:tailEnd type="none" w="sm" len="sm"/>
+          </a:ln>
+          <a:effectLst/>
+          <a:extLst>
+            <a:ext uri="{AF507438-7753-43e0-B8FC-AC1667EBCBE1}">
+              <a14:hiddenEffects xmlns:a14="http://schemas.microsoft.com/office/drawing/2010/main">
+                <a:effectLst>
+                  <a:outerShdw blurRad="63500" dist="38099" dir="2700000" algn="ctr" rotWithShape="0">
+                    <a:schemeClr val="bg2">
+                      <a:alpha val="74998"/>
+                    </a:schemeClr>
+                  </a:outerShdw>
+                </a:effectLst>
+              </a14:hiddenEffects>
+            </a:ext>
+          </a:extLst>
+        </p:spPr>
+        <p:txBody>
+          <a:bodyPr wrap="none" anchor="ctr"/>
+          <a:lstStyle/>
+          <a:p>
+            <a:endParaRPr lang="en-US"/>
+          </a:p>
+        </p:txBody>
+      </p:sp>
+      <p:sp>
+        <p:nvSpPr>
+          <p:cNvPr id="441352" name="Rectangle 8"/>
+          <p:cNvSpPr>
+            <a:spLocks noChangeArrowheads="1"/>
+          </p:cNvSpPr>
+          <p:nvPr/>
+        </p:nvSpPr>
+        <p:spPr bwMode="auto">
+          <a:xfrm>
+            <a:off x="381000" y="3618875"/>
+            <a:ext cx="548054" cy="645826"/>
+          </a:xfrm>
+          <a:prstGeom prst="rect">
+            <a:avLst/>
+          </a:prstGeom>
+          <a:solidFill>
+            <a:schemeClr val="accent1"/>
+          </a:solidFill>
+          <a:ln w="12700" cap="sq">
             <a:solidFill>
-              <a:schemeClr val="accent1"/>
+              <a:schemeClr val="tx1"/>
             </a:solidFill>
-            <a:ln w="12700" cap="sq">
-              <a:solidFill>
-                <a:schemeClr val="tx1"/>
-              </a:solidFill>
-              <a:miter lim="800000"/>
-              <a:headEnd type="none" w="sm" len="sm"/>
-              <a:tailEnd type="none" w="sm" len="sm"/>
-            </a:ln>
-            <a:effectLst/>
-            <a:extLst>
-              <a:ext uri="{AF507438-7753-43e0-B8FC-AC1667EBCBE1}">
-                <a14:hiddenEffects xmlns:a14="http://schemas.microsoft.com/office/drawing/2010/main">
-                  <a:effectLst>
-                    <a:outerShdw blurRad="63500" dist="38099" dir="2700000" algn="ctr" rotWithShape="0">
-                      <a:schemeClr val="bg2">
-                        <a:alpha val="74998"/>
-                      </a:schemeClr>
-                    </a:outerShdw>
-                  </a:effectLst>
-                </a14:hiddenEffects>
-              </a:ext>
-            </a:extLst>
-          </p:spPr>
-          <p:txBody>
-            <a:bodyPr wrap="none" anchor="ctr"/>
-            <a:lstStyle/>
-            <a:p>
-              <a:endParaRPr lang="en-US"/>
-            </a:p>
-          </p:txBody>
-        </p:sp>
-        <p:sp>
-          <p:nvSpPr>
-            <p:cNvPr id="441353" name="Rectangle 9"/>
-            <p:cNvSpPr>
-              <a:spLocks noChangeArrowheads="1"/>
-            </p:cNvSpPr>
-            <p:nvPr/>
-          </p:nvSpPr>
-          <p:spPr bwMode="auto">
-            <a:xfrm>
-              <a:off x="4272" y="3552"/>
-              <a:ext cx="528" cy="528"/>
-            </a:xfrm>
-            <a:prstGeom prst="rect">
-              <a:avLst/>
-            </a:prstGeom>
+            <a:miter lim="800000"/>
+            <a:headEnd type="none" w="sm" len="sm"/>
+            <a:tailEnd type="none" w="sm" len="sm"/>
+          </a:ln>
+          <a:effectLst/>
+          <a:extLst>
+            <a:ext uri="{AF507438-7753-43e0-B8FC-AC1667EBCBE1}">
+              <a14:hiddenEffects xmlns:a14="http://schemas.microsoft.com/office/drawing/2010/main">
+                <a:effectLst>
+                  <a:outerShdw blurRad="63500" dist="38099" dir="2700000" algn="ctr" rotWithShape="0">
+                    <a:schemeClr val="bg2">
+                      <a:alpha val="74998"/>
+                    </a:schemeClr>
+                  </a:outerShdw>
+                </a:effectLst>
+              </a14:hiddenEffects>
+            </a:ext>
+          </a:extLst>
+        </p:spPr>
+        <p:txBody>
+          <a:bodyPr wrap="none" anchor="ctr"/>
+          <a:lstStyle/>
+          <a:p>
+            <a:endParaRPr lang="en-US"/>
+          </a:p>
+        </p:txBody>
+      </p:sp>
+      <p:sp>
+        <p:nvSpPr>
+          <p:cNvPr id="441353" name="Rectangle 9"/>
+          <p:cNvSpPr>
+            <a:spLocks noChangeArrowheads="1"/>
+          </p:cNvSpPr>
+          <p:nvPr/>
+        </p:nvSpPr>
+        <p:spPr bwMode="auto">
+          <a:xfrm>
+            <a:off x="3795346" y="5145374"/>
+            <a:ext cx="548054" cy="645826"/>
+          </a:xfrm>
+          <a:prstGeom prst="rect">
+            <a:avLst/>
+          </a:prstGeom>
+          <a:solidFill>
+            <a:schemeClr val="accent1"/>
+          </a:solidFill>
+          <a:ln w="12700" cap="sq">
             <a:solidFill>
-              <a:schemeClr val="accent1"/>
+              <a:schemeClr val="tx1"/>
             </a:solidFill>
-            <a:ln w="12700" cap="sq">
-              <a:solidFill>
-                <a:schemeClr val="tx1"/>
-              </a:solidFill>
-              <a:miter lim="800000"/>
-              <a:headEnd type="none" w="sm" len="sm"/>
-              <a:tailEnd type="none" w="sm" len="sm"/>
-            </a:ln>
-            <a:effectLst/>
-            <a:extLst>
-              <a:ext uri="{AF507438-7753-43e0-B8FC-AC1667EBCBE1}">
-                <a14:hiddenEffects xmlns:a14="http://schemas.microsoft.com/office/drawing/2010/main">
-                  <a:effectLst>
-                    <a:outerShdw blurRad="63500" dist="38099" dir="2700000" algn="ctr" rotWithShape="0">
-                      <a:schemeClr val="bg2">
-                        <a:alpha val="74998"/>
-                      </a:schemeClr>
-                    </a:outerShdw>
-                  </a:effectLst>
-                </a14:hiddenEffects>
-              </a:ext>
-            </a:extLst>
-          </p:spPr>
-          <p:txBody>
-            <a:bodyPr wrap="none" anchor="ctr"/>
-            <a:lstStyle/>
-            <a:p>
-              <a:endParaRPr lang="en-US"/>
-            </a:p>
-          </p:txBody>
-        </p:sp>
-        <p:sp>
-          <p:nvSpPr>
-            <p:cNvPr id="441354" name="Rectangle 10"/>
-            <p:cNvSpPr>
-              <a:spLocks noChangeArrowheads="1"/>
-            </p:cNvSpPr>
-            <p:nvPr/>
-          </p:nvSpPr>
-          <p:spPr bwMode="auto">
-            <a:xfrm>
-              <a:off x="2736" y="3600"/>
-              <a:ext cx="528" cy="528"/>
-            </a:xfrm>
-            <a:prstGeom prst="rect">
-              <a:avLst/>
-            </a:prstGeom>
+            <a:miter lim="800000"/>
+            <a:headEnd type="none" w="sm" len="sm"/>
+            <a:tailEnd type="none" w="sm" len="sm"/>
+          </a:ln>
+          <a:effectLst/>
+          <a:extLst>
+            <a:ext uri="{AF507438-7753-43e0-B8FC-AC1667EBCBE1}">
+              <a14:hiddenEffects xmlns:a14="http://schemas.microsoft.com/office/drawing/2010/main">
+                <a:effectLst>
+                  <a:outerShdw blurRad="63500" dist="38099" dir="2700000" algn="ctr" rotWithShape="0">
+                    <a:schemeClr val="bg2">
+                      <a:alpha val="74998"/>
+                    </a:schemeClr>
+                  </a:outerShdw>
+                </a:effectLst>
+              </a14:hiddenEffects>
+            </a:ext>
+          </a:extLst>
+        </p:spPr>
+        <p:txBody>
+          <a:bodyPr wrap="none" anchor="ctr"/>
+          <a:lstStyle/>
+          <a:p>
+            <a:endParaRPr lang="en-US"/>
+          </a:p>
+        </p:txBody>
+      </p:sp>
+      <p:sp>
+        <p:nvSpPr>
+          <p:cNvPr id="441354" name="Rectangle 10"/>
+          <p:cNvSpPr>
+            <a:spLocks noChangeArrowheads="1"/>
+          </p:cNvSpPr>
+          <p:nvPr/>
+        </p:nvSpPr>
+        <p:spPr bwMode="auto">
+          <a:xfrm>
+            <a:off x="2124808" y="5145374"/>
+            <a:ext cx="548054" cy="645826"/>
+          </a:xfrm>
+          <a:prstGeom prst="rect">
+            <a:avLst/>
+          </a:prstGeom>
+          <a:solidFill>
+            <a:schemeClr val="accent1"/>
+          </a:solidFill>
+          <a:ln w="12700" cap="sq">
             <a:solidFill>
-              <a:schemeClr val="accent1"/>
+              <a:schemeClr val="tx1"/>
             </a:solidFill>
-            <a:ln w="12700" cap="sq">
-              <a:solidFill>
-                <a:schemeClr val="tx1"/>
-              </a:solidFill>
-              <a:miter lim="800000"/>
-              <a:headEnd type="none" w="sm" len="sm"/>
-              <a:tailEnd type="none" w="sm" len="sm"/>
-            </a:ln>
-            <a:effectLst/>
-            <a:extLst>
-              <a:ext uri="{AF507438-7753-43e0-B8FC-AC1667EBCBE1}">
-                <a14:hiddenEffects xmlns:a14="http://schemas.microsoft.com/office/drawing/2010/main">
-                  <a:effectLst>
-                    <a:outerShdw blurRad="63500" dist="38099" dir="2700000" algn="ctr" rotWithShape="0">
-                      <a:schemeClr val="bg2">
-                        <a:alpha val="74998"/>
-                      </a:schemeClr>
-                    </a:outerShdw>
-                  </a:effectLst>
-                </a14:hiddenEffects>
-              </a:ext>
-            </a:extLst>
-          </p:spPr>
-          <p:txBody>
-            <a:bodyPr wrap="none" anchor="ctr"/>
-            <a:lstStyle/>
-            <a:p>
-              <a:endParaRPr lang="en-US"/>
-            </a:p>
-          </p:txBody>
-        </p:sp>
-        <p:sp>
-          <p:nvSpPr>
-            <p:cNvPr id="441355" name="Rectangle 11"/>
-            <p:cNvSpPr>
-              <a:spLocks noChangeArrowheads="1"/>
-            </p:cNvSpPr>
-            <p:nvPr/>
-          </p:nvSpPr>
-          <p:spPr bwMode="auto">
-            <a:xfrm>
-              <a:off x="1056" y="3552"/>
-              <a:ext cx="528" cy="528"/>
-            </a:xfrm>
-            <a:prstGeom prst="rect">
-              <a:avLst/>
-            </a:prstGeom>
+            <a:miter lim="800000"/>
+            <a:headEnd type="none" w="sm" len="sm"/>
+            <a:tailEnd type="none" w="sm" len="sm"/>
+          </a:ln>
+          <a:effectLst/>
+          <a:extLst>
+            <a:ext uri="{AF507438-7753-43e0-B8FC-AC1667EBCBE1}">
+              <a14:hiddenEffects xmlns:a14="http://schemas.microsoft.com/office/drawing/2010/main">
+                <a:effectLst>
+                  <a:outerShdw blurRad="63500" dist="38099" dir="2700000" algn="ctr" rotWithShape="0">
+                    <a:schemeClr val="bg2">
+                      <a:alpha val="74998"/>
+                    </a:schemeClr>
+                  </a:outerShdw>
+                </a:effectLst>
+              </a14:hiddenEffects>
+            </a:ext>
+          </a:extLst>
+        </p:spPr>
+        <p:txBody>
+          <a:bodyPr wrap="none" anchor="ctr"/>
+          <a:lstStyle/>
+          <a:p>
+            <a:endParaRPr lang="en-US"/>
+          </a:p>
+        </p:txBody>
+      </p:sp>
+      <p:sp>
+        <p:nvSpPr>
+          <p:cNvPr id="441355" name="Rectangle 11"/>
+          <p:cNvSpPr>
+            <a:spLocks noChangeArrowheads="1"/>
+          </p:cNvSpPr>
+          <p:nvPr/>
+        </p:nvSpPr>
+        <p:spPr bwMode="auto">
+          <a:xfrm>
+            <a:off x="381000" y="5029200"/>
+            <a:ext cx="548054" cy="645826"/>
+          </a:xfrm>
+          <a:prstGeom prst="rect">
+            <a:avLst/>
+          </a:prstGeom>
+          <a:solidFill>
+            <a:schemeClr val="accent1"/>
+          </a:solidFill>
+          <a:ln w="12700" cap="sq">
             <a:solidFill>
-              <a:schemeClr val="accent1"/>
+              <a:schemeClr val="tx1"/>
             </a:solidFill>
-            <a:ln w="12700" cap="sq">
-              <a:solidFill>
-                <a:schemeClr val="tx1"/>
-              </a:solidFill>
-              <a:miter lim="800000"/>
-              <a:headEnd type="none" w="sm" len="sm"/>
-              <a:tailEnd type="none" w="sm" len="sm"/>
-            </a:ln>
-            <a:effectLst/>
-            <a:extLst>
-              <a:ext uri="{AF507438-7753-43e0-B8FC-AC1667EBCBE1}">
-                <a14:hiddenEffects xmlns:a14="http://schemas.microsoft.com/office/drawing/2010/main">
-                  <a:effectLst>
-                    <a:outerShdw blurRad="63500" dist="38099" dir="2700000" algn="ctr" rotWithShape="0">
-                      <a:schemeClr val="bg2">
-                        <a:alpha val="74998"/>
-                      </a:schemeClr>
-                    </a:outerShdw>
-                  </a:effectLst>
-                </a14:hiddenEffects>
-              </a:ext>
-            </a:extLst>
-          </p:spPr>
-          <p:txBody>
-            <a:bodyPr wrap="none" anchor="ctr"/>
-            <a:lstStyle/>
-            <a:p>
-              <a:endParaRPr lang="en-US"/>
-            </a:p>
-          </p:txBody>
-        </p:sp>
-        <p:sp>
-          <p:nvSpPr>
-            <p:cNvPr id="441356" name="Rectangle 12"/>
-            <p:cNvSpPr>
-              <a:spLocks noChangeArrowheads="1"/>
-            </p:cNvSpPr>
-            <p:nvPr/>
-          </p:nvSpPr>
-          <p:spPr bwMode="auto">
-            <a:xfrm>
-              <a:off x="4272" y="2400"/>
-              <a:ext cx="528" cy="528"/>
-            </a:xfrm>
-            <a:prstGeom prst="rect">
-              <a:avLst/>
-            </a:prstGeom>
+            <a:miter lim="800000"/>
+            <a:headEnd type="none" w="sm" len="sm"/>
+            <a:tailEnd type="none" w="sm" len="sm"/>
+          </a:ln>
+          <a:effectLst/>
+          <a:extLst>
+            <a:ext uri="{AF507438-7753-43e0-B8FC-AC1667EBCBE1}">
+              <a14:hiddenEffects xmlns:a14="http://schemas.microsoft.com/office/drawing/2010/main">
+                <a:effectLst>
+                  <a:outerShdw blurRad="63500" dist="38099" dir="2700000" algn="ctr" rotWithShape="0">
+                    <a:schemeClr val="bg2">
+                      <a:alpha val="74998"/>
+                    </a:schemeClr>
+                  </a:outerShdw>
+                </a:effectLst>
+              </a14:hiddenEffects>
+            </a:ext>
+          </a:extLst>
+        </p:spPr>
+        <p:txBody>
+          <a:bodyPr wrap="none" anchor="ctr"/>
+          <a:lstStyle/>
+          <a:p>
+            <a:endParaRPr lang="en-US"/>
+          </a:p>
+        </p:txBody>
+      </p:sp>
+      <p:sp>
+        <p:nvSpPr>
+          <p:cNvPr id="441356" name="Rectangle 12"/>
+          <p:cNvSpPr>
+            <a:spLocks noChangeArrowheads="1"/>
+          </p:cNvSpPr>
+          <p:nvPr/>
+        </p:nvSpPr>
+        <p:spPr bwMode="auto">
+          <a:xfrm>
+            <a:off x="3795346" y="3697574"/>
+            <a:ext cx="548054" cy="645826"/>
+          </a:xfrm>
+          <a:prstGeom prst="rect">
+            <a:avLst/>
+          </a:prstGeom>
+          <a:solidFill>
+            <a:schemeClr val="accent1"/>
+          </a:solidFill>
+          <a:ln w="12700" cap="sq">
             <a:solidFill>
-              <a:schemeClr val="accent1"/>
+              <a:schemeClr val="tx1"/>
             </a:solidFill>
-            <a:ln w="12700" cap="sq">
-              <a:solidFill>
-                <a:schemeClr val="tx1"/>
-              </a:solidFill>
-              <a:miter lim="800000"/>
-              <a:headEnd type="none" w="sm" len="sm"/>
-              <a:tailEnd type="none" w="sm" len="sm"/>
-            </a:ln>
-            <a:effectLst/>
-            <a:extLst>
-              <a:ext uri="{AF507438-7753-43e0-B8FC-AC1667EBCBE1}">
-                <a14:hiddenEffects xmlns:a14="http://schemas.microsoft.com/office/drawing/2010/main">
-                  <a:effectLst>
-                    <a:outerShdw blurRad="63500" dist="38099" dir="2700000" algn="ctr" rotWithShape="0">
-                      <a:schemeClr val="bg2">
-                        <a:alpha val="74998"/>
-                      </a:schemeClr>
-                    </a:outerShdw>
-                  </a:effectLst>
-                </a14:hiddenEffects>
-              </a:ext>
-            </a:extLst>
-          </p:spPr>
-          <p:txBody>
-            <a:bodyPr wrap="none" anchor="ctr"/>
-            <a:lstStyle/>
-            <a:p>
-              <a:endParaRPr lang="en-US"/>
-            </a:p>
-          </p:txBody>
-        </p:sp>
-        <p:sp>
-          <p:nvSpPr>
-            <p:cNvPr id="441357" name="AutoShape 13"/>
-            <p:cNvSpPr>
-              <a:spLocks noChangeArrowheads="1"/>
-            </p:cNvSpPr>
-            <p:nvPr/>
-          </p:nvSpPr>
-          <p:spPr bwMode="auto">
-            <a:xfrm>
-              <a:off x="1968" y="2544"/>
-              <a:ext cx="384" cy="240"/>
-            </a:xfrm>
-            <a:prstGeom prst="diamond">
-              <a:avLst/>
-            </a:prstGeom>
+            <a:miter lim="800000"/>
+            <a:headEnd type="none" w="sm" len="sm"/>
+            <a:tailEnd type="none" w="sm" len="sm"/>
+          </a:ln>
+          <a:effectLst/>
+          <a:extLst>
+            <a:ext uri="{AF507438-7753-43e0-B8FC-AC1667EBCBE1}">
+              <a14:hiddenEffects xmlns:a14="http://schemas.microsoft.com/office/drawing/2010/main">
+                <a:effectLst>
+                  <a:outerShdw blurRad="63500" dist="38099" dir="2700000" algn="ctr" rotWithShape="0">
+                    <a:schemeClr val="bg2">
+                      <a:alpha val="74998"/>
+                    </a:schemeClr>
+                  </a:outerShdw>
+                </a:effectLst>
+              </a14:hiddenEffects>
+            </a:ext>
+          </a:extLst>
+        </p:spPr>
+        <p:txBody>
+          <a:bodyPr wrap="none" anchor="ctr"/>
+          <a:lstStyle/>
+          <a:p>
+            <a:endParaRPr lang="en-US"/>
+          </a:p>
+        </p:txBody>
+      </p:sp>
+      <p:sp>
+        <p:nvSpPr>
+          <p:cNvPr id="441358" name="AutoShape 14"/>
+          <p:cNvSpPr>
+            <a:spLocks noChangeArrowheads="1"/>
+          </p:cNvSpPr>
+          <p:nvPr/>
+        </p:nvSpPr>
+        <p:spPr bwMode="auto">
+          <a:xfrm>
+            <a:off x="1427285" y="3149184"/>
+            <a:ext cx="398585" cy="293557"/>
+          </a:xfrm>
+          <a:prstGeom prst="diamond">
+            <a:avLst/>
+          </a:prstGeom>
+          <a:solidFill>
+            <a:srgbClr val="FF00FF"/>
+          </a:solidFill>
+          <a:ln w="12700" cap="sq">
             <a:solidFill>
-              <a:srgbClr val="FF00FF"/>
+              <a:schemeClr val="tx1"/>
             </a:solidFill>
-            <a:ln w="12700" cap="sq">
-              <a:solidFill>
-                <a:schemeClr val="tx1"/>
-              </a:solidFill>
-              <a:miter lim="800000"/>
-              <a:headEnd type="none" w="sm" len="sm"/>
-              <a:tailEnd type="none" w="sm" len="sm"/>
-            </a:ln>
-            <a:effectLst/>
-            <a:extLst>
-              <a:ext uri="{AF507438-7753-43e0-B8FC-AC1667EBCBE1}">
-                <a14:hiddenEffects xmlns:a14="http://schemas.microsoft.com/office/drawing/2010/main">
-                  <a:effectLst>
-                    <a:outerShdw blurRad="63500" dist="38099" dir="2700000" algn="ctr" rotWithShape="0">
-                      <a:schemeClr val="bg2">
-                        <a:alpha val="74998"/>
-                      </a:schemeClr>
-                    </a:outerShdw>
-                  </a:effectLst>
-                </a14:hiddenEffects>
-              </a:ext>
-            </a:extLst>
-          </p:spPr>
-          <p:txBody>
-            <a:bodyPr wrap="none" anchor="ctr"/>
-            <a:lstStyle/>
-            <a:p>
-              <a:endParaRPr lang="en-US"/>
-            </a:p>
-          </p:txBody>
-        </p:sp>
-        <p:sp>
-          <p:nvSpPr>
-            <p:cNvPr id="441358" name="AutoShape 14"/>
-            <p:cNvSpPr>
-              <a:spLocks noChangeArrowheads="1"/>
-            </p:cNvSpPr>
-            <p:nvPr/>
-          </p:nvSpPr>
-          <p:spPr bwMode="auto">
-            <a:xfrm>
-              <a:off x="2064" y="1968"/>
-              <a:ext cx="384" cy="240"/>
-            </a:xfrm>
-            <a:prstGeom prst="diamond">
-              <a:avLst/>
-            </a:prstGeom>
+            <a:miter lim="800000"/>
+            <a:headEnd type="none" w="sm" len="sm"/>
+            <a:tailEnd type="none" w="sm" len="sm"/>
+          </a:ln>
+          <a:effectLst/>
+          <a:extLst>
+            <a:ext uri="{AF507438-7753-43e0-B8FC-AC1667EBCBE1}">
+              <a14:hiddenEffects xmlns:a14="http://schemas.microsoft.com/office/drawing/2010/main">
+                <a:effectLst>
+                  <a:outerShdw blurRad="63500" dist="38099" dir="2700000" algn="ctr" rotWithShape="0">
+                    <a:schemeClr val="bg2">
+                      <a:alpha val="74998"/>
+                    </a:schemeClr>
+                  </a:outerShdw>
+                </a:effectLst>
+              </a14:hiddenEffects>
+            </a:ext>
+          </a:extLst>
+        </p:spPr>
+        <p:txBody>
+          <a:bodyPr wrap="none" anchor="ctr"/>
+          <a:lstStyle/>
+          <a:p>
+            <a:endParaRPr lang="en-US"/>
+          </a:p>
+        </p:txBody>
+      </p:sp>
+      <p:sp>
+        <p:nvSpPr>
+          <p:cNvPr id="441359" name="AutoShape 15"/>
+          <p:cNvSpPr>
+            <a:spLocks noChangeArrowheads="1"/>
+          </p:cNvSpPr>
+          <p:nvPr/>
+        </p:nvSpPr>
+        <p:spPr bwMode="auto">
+          <a:xfrm>
+            <a:off x="1377462" y="4558259"/>
+            <a:ext cx="398585" cy="293557"/>
+          </a:xfrm>
+          <a:prstGeom prst="diamond">
+            <a:avLst/>
+          </a:prstGeom>
+          <a:solidFill>
+            <a:srgbClr val="FF00FF"/>
+          </a:solidFill>
+          <a:ln w="12700" cap="sq">
             <a:solidFill>
-              <a:srgbClr val="FF00FF"/>
+              <a:schemeClr val="tx1"/>
             </a:solidFill>
-            <a:ln w="12700" cap="sq">
-              <a:solidFill>
-                <a:schemeClr val="tx1"/>
-              </a:solidFill>
-              <a:miter lim="800000"/>
-              <a:headEnd type="none" w="sm" len="sm"/>
-              <a:tailEnd type="none" w="sm" len="sm"/>
-            </a:ln>
-            <a:effectLst/>
-            <a:extLst>
-              <a:ext uri="{AF507438-7753-43e0-B8FC-AC1667EBCBE1}">
-                <a14:hiddenEffects xmlns:a14="http://schemas.microsoft.com/office/drawing/2010/main">
-                  <a:effectLst>
-                    <a:outerShdw blurRad="63500" dist="38099" dir="2700000" algn="ctr" rotWithShape="0">
-                      <a:schemeClr val="bg2">
-                        <a:alpha val="74998"/>
-                      </a:schemeClr>
-                    </a:outerShdw>
-                  </a:effectLst>
-                </a14:hiddenEffects>
-              </a:ext>
-            </a:extLst>
-          </p:spPr>
-          <p:txBody>
-            <a:bodyPr wrap="none" anchor="ctr"/>
-            <a:lstStyle/>
-            <a:p>
-              <a:endParaRPr lang="en-US"/>
-            </a:p>
-          </p:txBody>
-        </p:sp>
-        <p:sp>
-          <p:nvSpPr>
-            <p:cNvPr id="441359" name="AutoShape 15"/>
-            <p:cNvSpPr>
-              <a:spLocks noChangeArrowheads="1"/>
-            </p:cNvSpPr>
-            <p:nvPr/>
-          </p:nvSpPr>
-          <p:spPr bwMode="auto">
-            <a:xfrm>
-              <a:off x="2016" y="3120"/>
-              <a:ext cx="384" cy="240"/>
-            </a:xfrm>
-            <a:prstGeom prst="diamond">
-              <a:avLst/>
-            </a:prstGeom>
+            <a:miter lim="800000"/>
+            <a:headEnd type="none" w="sm" len="sm"/>
+            <a:tailEnd type="none" w="sm" len="sm"/>
+          </a:ln>
+          <a:effectLst/>
+          <a:extLst>
+            <a:ext uri="{AF507438-7753-43e0-B8FC-AC1667EBCBE1}">
+              <a14:hiddenEffects xmlns:a14="http://schemas.microsoft.com/office/drawing/2010/main">
+                <a:effectLst>
+                  <a:outerShdw blurRad="63500" dist="38099" dir="2700000" algn="ctr" rotWithShape="0">
+                    <a:schemeClr val="bg2">
+                      <a:alpha val="74998"/>
+                    </a:schemeClr>
+                  </a:outerShdw>
+                </a:effectLst>
+              </a14:hiddenEffects>
+            </a:ext>
+          </a:extLst>
+        </p:spPr>
+        <p:txBody>
+          <a:bodyPr wrap="none" anchor="ctr"/>
+          <a:lstStyle/>
+          <a:p>
+            <a:endParaRPr lang="en-US"/>
+          </a:p>
+        </p:txBody>
+      </p:sp>
+      <p:sp>
+        <p:nvSpPr>
+          <p:cNvPr id="441360" name="AutoShape 16"/>
+          <p:cNvSpPr>
+            <a:spLocks noChangeArrowheads="1"/>
+          </p:cNvSpPr>
+          <p:nvPr/>
+        </p:nvSpPr>
+        <p:spPr bwMode="auto">
+          <a:xfrm>
+            <a:off x="2174631" y="4616970"/>
+            <a:ext cx="398585" cy="293557"/>
+          </a:xfrm>
+          <a:prstGeom prst="diamond">
+            <a:avLst/>
+          </a:prstGeom>
+          <a:solidFill>
+            <a:srgbClr val="FF00FF"/>
+          </a:solidFill>
+          <a:ln w="12700" cap="sq">
             <a:solidFill>
-              <a:srgbClr val="FF00FF"/>
+              <a:schemeClr val="tx1"/>
             </a:solidFill>
-            <a:ln w="12700" cap="sq">
-              <a:solidFill>
-                <a:schemeClr val="tx1"/>
-              </a:solidFill>
-              <a:miter lim="800000"/>
-              <a:headEnd type="none" w="sm" len="sm"/>
-              <a:tailEnd type="none" w="sm" len="sm"/>
-            </a:ln>
-            <a:effectLst/>
-            <a:extLst>
-              <a:ext uri="{AF507438-7753-43e0-B8FC-AC1667EBCBE1}">
-                <a14:hiddenEffects xmlns:a14="http://schemas.microsoft.com/office/drawing/2010/main">
-                  <a:effectLst>
-                    <a:outerShdw blurRad="63500" dist="38099" dir="2700000" algn="ctr" rotWithShape="0">
-                      <a:schemeClr val="bg2">
-                        <a:alpha val="74998"/>
-                      </a:schemeClr>
-                    </a:outerShdw>
-                  </a:effectLst>
-                </a14:hiddenEffects>
-              </a:ext>
-            </a:extLst>
-          </p:spPr>
-          <p:txBody>
-            <a:bodyPr wrap="none" anchor="ctr"/>
-            <a:lstStyle/>
-            <a:p>
-              <a:endParaRPr lang="en-US"/>
-            </a:p>
-          </p:txBody>
-        </p:sp>
-        <p:sp>
-          <p:nvSpPr>
-            <p:cNvPr id="441360" name="AutoShape 16"/>
-            <p:cNvSpPr>
-              <a:spLocks noChangeArrowheads="1"/>
-            </p:cNvSpPr>
-            <p:nvPr/>
-          </p:nvSpPr>
-          <p:spPr bwMode="auto">
-            <a:xfrm>
-              <a:off x="2784" y="3168"/>
-              <a:ext cx="384" cy="240"/>
-            </a:xfrm>
-            <a:prstGeom prst="diamond">
-              <a:avLst/>
-            </a:prstGeom>
+            <a:miter lim="800000"/>
+            <a:headEnd type="none" w="sm" len="sm"/>
+            <a:tailEnd type="none" w="sm" len="sm"/>
+          </a:ln>
+          <a:effectLst/>
+          <a:extLst>
+            <a:ext uri="{AF507438-7753-43e0-B8FC-AC1667EBCBE1}">
+              <a14:hiddenEffects xmlns:a14="http://schemas.microsoft.com/office/drawing/2010/main">
+                <a:effectLst>
+                  <a:outerShdw blurRad="63500" dist="38099" dir="2700000" algn="ctr" rotWithShape="0">
+                    <a:schemeClr val="bg2">
+                      <a:alpha val="74998"/>
+                    </a:schemeClr>
+                  </a:outerShdw>
+                </a:effectLst>
+              </a14:hiddenEffects>
+            </a:ext>
+          </a:extLst>
+        </p:spPr>
+        <p:txBody>
+          <a:bodyPr wrap="none" anchor="ctr"/>
+          <a:lstStyle/>
+          <a:p>
+            <a:endParaRPr lang="en-US"/>
+          </a:p>
+        </p:txBody>
+      </p:sp>
+      <p:sp>
+        <p:nvSpPr>
+          <p:cNvPr id="441361" name="AutoShape 17"/>
+          <p:cNvSpPr>
+            <a:spLocks noChangeArrowheads="1"/>
+          </p:cNvSpPr>
+          <p:nvPr/>
+        </p:nvSpPr>
+        <p:spPr bwMode="auto">
+          <a:xfrm>
+            <a:off x="3106615" y="4572000"/>
+            <a:ext cx="398585" cy="293557"/>
+          </a:xfrm>
+          <a:prstGeom prst="diamond">
+            <a:avLst/>
+          </a:prstGeom>
+          <a:solidFill>
+            <a:srgbClr val="FF00FF"/>
+          </a:solidFill>
+          <a:ln w="12700" cap="sq">
             <a:solidFill>
-              <a:srgbClr val="FF00FF"/>
+              <a:schemeClr val="tx1"/>
             </a:solidFill>
-            <a:ln w="12700" cap="sq">
-              <a:solidFill>
-                <a:schemeClr val="tx1"/>
-              </a:solidFill>
-              <a:miter lim="800000"/>
-              <a:headEnd type="none" w="sm" len="sm"/>
-              <a:tailEnd type="none" w="sm" len="sm"/>
-            </a:ln>
-            <a:effectLst/>
-            <a:extLst>
-              <a:ext uri="{AF507438-7753-43e0-B8FC-AC1667EBCBE1}">
-                <a14:hiddenEffects xmlns:a14="http://schemas.microsoft.com/office/drawing/2010/main">
-                  <a:effectLst>
-                    <a:outerShdw blurRad="63500" dist="38099" dir="2700000" algn="ctr" rotWithShape="0">
-                      <a:schemeClr val="bg2">
-                        <a:alpha val="74998"/>
-                      </a:schemeClr>
-                    </a:outerShdw>
-                  </a:effectLst>
-                </a14:hiddenEffects>
-              </a:ext>
-            </a:extLst>
-          </p:spPr>
-          <p:txBody>
-            <a:bodyPr wrap="none" anchor="ctr"/>
-            <a:lstStyle/>
-            <a:p>
-              <a:endParaRPr lang="en-US"/>
-            </a:p>
-          </p:txBody>
-        </p:sp>
-        <p:sp>
-          <p:nvSpPr>
-            <p:cNvPr id="441361" name="AutoShape 17"/>
-            <p:cNvSpPr>
-              <a:spLocks noChangeArrowheads="1"/>
-            </p:cNvSpPr>
-            <p:nvPr/>
-          </p:nvSpPr>
-          <p:spPr bwMode="auto">
-            <a:xfrm>
-              <a:off x="3552" y="3120"/>
-              <a:ext cx="384" cy="240"/>
-            </a:xfrm>
-            <a:prstGeom prst="diamond">
-              <a:avLst/>
-            </a:prstGeom>
+            <a:miter lim="800000"/>
+            <a:headEnd type="none" w="sm" len="sm"/>
+            <a:tailEnd type="none" w="sm" len="sm"/>
+          </a:ln>
+          <a:effectLst/>
+          <a:extLst>
+            <a:ext uri="{AF507438-7753-43e0-B8FC-AC1667EBCBE1}">
+              <a14:hiddenEffects xmlns:a14="http://schemas.microsoft.com/office/drawing/2010/main">
+                <a:effectLst>
+                  <a:outerShdw blurRad="63500" dist="38099" dir="2700000" algn="ctr" rotWithShape="0">
+                    <a:schemeClr val="bg2">
+                      <a:alpha val="74998"/>
+                    </a:schemeClr>
+                  </a:outerShdw>
+                </a:effectLst>
+              </a14:hiddenEffects>
+            </a:ext>
+          </a:extLst>
+        </p:spPr>
+        <p:txBody>
+          <a:bodyPr wrap="none" anchor="ctr"/>
+          <a:lstStyle/>
+          <a:p>
+            <a:endParaRPr lang="en-US"/>
+          </a:p>
+        </p:txBody>
+      </p:sp>
+      <p:sp>
+        <p:nvSpPr>
+          <p:cNvPr id="441362" name="AutoShape 18"/>
+          <p:cNvSpPr>
+            <a:spLocks noChangeArrowheads="1"/>
+          </p:cNvSpPr>
+          <p:nvPr/>
+        </p:nvSpPr>
+        <p:spPr bwMode="auto">
+          <a:xfrm>
+            <a:off x="2971800" y="3149184"/>
+            <a:ext cx="398585" cy="293557"/>
+          </a:xfrm>
+          <a:prstGeom prst="diamond">
+            <a:avLst/>
+          </a:prstGeom>
+          <a:solidFill>
+            <a:srgbClr val="FF00FF"/>
+          </a:solidFill>
+          <a:ln w="12700" cap="sq">
             <a:solidFill>
-              <a:srgbClr val="FF00FF"/>
+              <a:schemeClr val="tx1"/>
             </a:solidFill>
-            <a:ln w="12700" cap="sq">
-              <a:solidFill>
-                <a:schemeClr val="tx1"/>
-              </a:solidFill>
-              <a:miter lim="800000"/>
-              <a:headEnd type="none" w="sm" len="sm"/>
-              <a:tailEnd type="none" w="sm" len="sm"/>
-            </a:ln>
-            <a:effectLst/>
-            <a:extLst>
-              <a:ext uri="{AF507438-7753-43e0-B8FC-AC1667EBCBE1}">
-                <a14:hiddenEffects xmlns:a14="http://schemas.microsoft.com/office/drawing/2010/main">
-                  <a:effectLst>
-                    <a:outerShdw blurRad="63500" dist="38099" dir="2700000" algn="ctr" rotWithShape="0">
-                      <a:schemeClr val="bg2">
-                        <a:alpha val="74998"/>
-                      </a:schemeClr>
-                    </a:outerShdw>
-                  </a:effectLst>
-                </a14:hiddenEffects>
-              </a:ext>
-            </a:extLst>
-          </p:spPr>
-          <p:txBody>
-            <a:bodyPr wrap="none" anchor="ctr"/>
-            <a:lstStyle/>
-            <a:p>
-              <a:endParaRPr lang="en-US"/>
-            </a:p>
-          </p:txBody>
-        </p:sp>
-        <p:sp>
-          <p:nvSpPr>
-            <p:cNvPr id="441362" name="AutoShape 18"/>
-            <p:cNvSpPr>
-              <a:spLocks noChangeArrowheads="1"/>
-            </p:cNvSpPr>
-            <p:nvPr/>
-          </p:nvSpPr>
-          <p:spPr bwMode="auto">
-            <a:xfrm>
-              <a:off x="3552" y="1968"/>
-              <a:ext cx="384" cy="240"/>
-            </a:xfrm>
-            <a:prstGeom prst="diamond">
-              <a:avLst/>
-            </a:prstGeom>
+            <a:miter lim="800000"/>
+            <a:headEnd type="none" w="sm" len="sm"/>
+            <a:tailEnd type="none" w="sm" len="sm"/>
+          </a:ln>
+          <a:effectLst/>
+          <a:extLst>
+            <a:ext uri="{AF507438-7753-43e0-B8FC-AC1667EBCBE1}">
+              <a14:hiddenEffects xmlns:a14="http://schemas.microsoft.com/office/drawing/2010/main">
+                <a:effectLst>
+                  <a:outerShdw blurRad="63500" dist="38099" dir="2700000" algn="ctr" rotWithShape="0">
+                    <a:schemeClr val="bg2">
+                      <a:alpha val="74998"/>
+                    </a:schemeClr>
+                  </a:outerShdw>
+                </a:effectLst>
+              </a14:hiddenEffects>
+            </a:ext>
+          </a:extLst>
+        </p:spPr>
+        <p:txBody>
+          <a:bodyPr wrap="none" anchor="ctr"/>
+          <a:lstStyle/>
+          <a:p>
+            <a:endParaRPr lang="en-US"/>
+          </a:p>
+        </p:txBody>
+      </p:sp>
+      <p:sp>
+        <p:nvSpPr>
+          <p:cNvPr id="441363" name="AutoShape 19"/>
+          <p:cNvSpPr>
+            <a:spLocks noChangeArrowheads="1"/>
+          </p:cNvSpPr>
+          <p:nvPr/>
+        </p:nvSpPr>
+        <p:spPr bwMode="auto">
+          <a:xfrm>
+            <a:off x="2209800" y="3124200"/>
+            <a:ext cx="398585" cy="293557"/>
+          </a:xfrm>
+          <a:prstGeom prst="diamond">
+            <a:avLst/>
+          </a:prstGeom>
+          <a:solidFill>
+            <a:srgbClr val="FF00FF"/>
+          </a:solidFill>
+          <a:ln w="12700" cap="sq">
             <a:solidFill>
-              <a:srgbClr val="FF00FF"/>
+              <a:schemeClr val="tx1"/>
             </a:solidFill>
-            <a:ln w="12700" cap="sq">
-              <a:solidFill>
-                <a:schemeClr val="tx1"/>
-              </a:solidFill>
-              <a:miter lim="800000"/>
-              <a:headEnd type="none" w="sm" len="sm"/>
-              <a:tailEnd type="none" w="sm" len="sm"/>
-            </a:ln>
-            <a:effectLst/>
-            <a:extLst>
-              <a:ext uri="{AF507438-7753-43e0-B8FC-AC1667EBCBE1}">
-                <a14:hiddenEffects xmlns:a14="http://schemas.microsoft.com/office/drawing/2010/main">
-                  <a:effectLst>
-                    <a:outerShdw blurRad="63500" dist="38099" dir="2700000" algn="ctr" rotWithShape="0">
-                      <a:schemeClr val="bg2">
-                        <a:alpha val="74998"/>
-                      </a:schemeClr>
-                    </a:outerShdw>
-                  </a:effectLst>
-                </a14:hiddenEffects>
-              </a:ext>
-            </a:extLst>
-          </p:spPr>
-          <p:txBody>
-            <a:bodyPr wrap="none" anchor="ctr"/>
-            <a:lstStyle/>
-            <a:p>
-              <a:endParaRPr lang="en-US"/>
-            </a:p>
-          </p:txBody>
-        </p:sp>
-        <p:sp>
-          <p:nvSpPr>
-            <p:cNvPr id="441363" name="AutoShape 19"/>
-            <p:cNvSpPr>
-              <a:spLocks noChangeArrowheads="1"/>
-            </p:cNvSpPr>
-            <p:nvPr/>
-          </p:nvSpPr>
-          <p:spPr bwMode="auto">
-            <a:xfrm>
-              <a:off x="2832" y="1968"/>
-              <a:ext cx="384" cy="240"/>
-            </a:xfrm>
-            <a:prstGeom prst="diamond">
-              <a:avLst/>
-            </a:prstGeom>
+            <a:miter lim="800000"/>
+            <a:headEnd type="none" w="sm" len="sm"/>
+            <a:tailEnd type="none" w="sm" len="sm"/>
+          </a:ln>
+          <a:effectLst/>
+          <a:extLst>
+            <a:ext uri="{AF507438-7753-43e0-B8FC-AC1667EBCBE1}">
+              <a14:hiddenEffects xmlns:a14="http://schemas.microsoft.com/office/drawing/2010/main">
+                <a:effectLst>
+                  <a:outerShdw blurRad="63500" dist="38099" dir="2700000" algn="ctr" rotWithShape="0">
+                    <a:schemeClr val="bg2">
+                      <a:alpha val="74998"/>
+                    </a:schemeClr>
+                  </a:outerShdw>
+                </a:effectLst>
+              </a14:hiddenEffects>
+            </a:ext>
+          </a:extLst>
+        </p:spPr>
+        <p:txBody>
+          <a:bodyPr wrap="none" anchor="ctr"/>
+          <a:lstStyle/>
+          <a:p>
+            <a:endParaRPr lang="en-US"/>
+          </a:p>
+        </p:txBody>
+      </p:sp>
+      <p:sp>
+        <p:nvSpPr>
+          <p:cNvPr id="441364" name="AutoShape 20"/>
+          <p:cNvSpPr>
+            <a:spLocks noChangeArrowheads="1"/>
+          </p:cNvSpPr>
+          <p:nvPr/>
+        </p:nvSpPr>
+        <p:spPr bwMode="auto">
+          <a:xfrm>
+            <a:off x="3048000" y="3897443"/>
+            <a:ext cx="398585" cy="293557"/>
+          </a:xfrm>
+          <a:prstGeom prst="diamond">
+            <a:avLst/>
+          </a:prstGeom>
+          <a:solidFill>
+            <a:srgbClr val="FF00FF"/>
+          </a:solidFill>
+          <a:ln w="12700" cap="sq">
             <a:solidFill>
-              <a:srgbClr val="FF00FF"/>
+              <a:schemeClr val="tx1"/>
             </a:solidFill>
-            <a:ln w="12700" cap="sq">
-              <a:solidFill>
-                <a:schemeClr val="tx1"/>
-              </a:solidFill>
-              <a:miter lim="800000"/>
-              <a:headEnd type="none" w="sm" len="sm"/>
-              <a:tailEnd type="none" w="sm" len="sm"/>
-            </a:ln>
-            <a:effectLst/>
-            <a:extLst>
-              <a:ext uri="{AF507438-7753-43e0-B8FC-AC1667EBCBE1}">
-                <a14:hiddenEffects xmlns:a14="http://schemas.microsoft.com/office/drawing/2010/main">
-                  <a:effectLst>
-                    <a:outerShdw blurRad="63500" dist="38099" dir="2700000" algn="ctr" rotWithShape="0">
-                      <a:schemeClr val="bg2">
-                        <a:alpha val="74998"/>
-                      </a:schemeClr>
-                    </a:outerShdw>
-                  </a:effectLst>
-                </a14:hiddenEffects>
-              </a:ext>
-            </a:extLst>
-          </p:spPr>
-          <p:txBody>
-            <a:bodyPr wrap="none" anchor="ctr"/>
-            <a:lstStyle/>
-            <a:p>
-              <a:endParaRPr lang="en-US"/>
-            </a:p>
-          </p:txBody>
-        </p:sp>
-        <p:sp>
-          <p:nvSpPr>
-            <p:cNvPr id="441364" name="AutoShape 20"/>
-            <p:cNvSpPr>
-              <a:spLocks noChangeArrowheads="1"/>
-            </p:cNvSpPr>
-            <p:nvPr/>
-          </p:nvSpPr>
-          <p:spPr bwMode="auto">
-            <a:xfrm>
-              <a:off x="3600" y="2544"/>
-              <a:ext cx="384" cy="240"/>
-            </a:xfrm>
-            <a:prstGeom prst="diamond">
-              <a:avLst/>
-            </a:prstGeom>
+            <a:miter lim="800000"/>
+            <a:headEnd type="none" w="sm" len="sm"/>
+            <a:tailEnd type="none" w="sm" len="sm"/>
+          </a:ln>
+          <a:effectLst/>
+          <a:extLst>
+            <a:ext uri="{AF507438-7753-43e0-B8FC-AC1667EBCBE1}">
+              <a14:hiddenEffects xmlns:a14="http://schemas.microsoft.com/office/drawing/2010/main">
+                <a:effectLst>
+                  <a:outerShdw blurRad="63500" dist="38099" dir="2700000" algn="ctr" rotWithShape="0">
+                    <a:schemeClr val="bg2">
+                      <a:alpha val="74998"/>
+                    </a:schemeClr>
+                  </a:outerShdw>
+                </a:effectLst>
+              </a14:hiddenEffects>
+            </a:ext>
+          </a:extLst>
+        </p:spPr>
+        <p:txBody>
+          <a:bodyPr wrap="none" anchor="ctr"/>
+          <a:lstStyle/>
+          <a:p>
+            <a:endParaRPr lang="en-US"/>
+          </a:p>
+        </p:txBody>
+      </p:sp>
+      <p:sp>
+        <p:nvSpPr>
+          <p:cNvPr id="441365" name="Line 21"/>
+          <p:cNvSpPr>
+            <a:spLocks noChangeShapeType="1"/>
+          </p:cNvSpPr>
+          <p:nvPr/>
+        </p:nvSpPr>
+        <p:spPr bwMode="auto">
+          <a:xfrm>
+            <a:off x="929054" y="4029856"/>
+            <a:ext cx="398585" cy="0"/>
+          </a:xfrm>
+          <a:prstGeom prst="line">
+            <a:avLst/>
+          </a:prstGeom>
+          <a:noFill/>
+          <a:ln w="28575" cap="sq">
             <a:solidFill>
-              <a:srgbClr val="FF00FF"/>
+              <a:schemeClr val="tx1"/>
             </a:solidFill>
-            <a:ln w="12700" cap="sq">
-              <a:solidFill>
-                <a:schemeClr val="tx1"/>
-              </a:solidFill>
-              <a:miter lim="800000"/>
-              <a:headEnd type="none" w="sm" len="sm"/>
-              <a:tailEnd type="none" w="sm" len="sm"/>
-            </a:ln>
-            <a:effectLst/>
-            <a:extLst>
-              <a:ext uri="{AF507438-7753-43e0-B8FC-AC1667EBCBE1}">
-                <a14:hiddenEffects xmlns:a14="http://schemas.microsoft.com/office/drawing/2010/main">
-                  <a:effectLst>
-                    <a:outerShdw blurRad="63500" dist="38099" dir="2700000" algn="ctr" rotWithShape="0">
-                      <a:schemeClr val="bg2">
-                        <a:alpha val="74998"/>
-                      </a:schemeClr>
-                    </a:outerShdw>
-                  </a:effectLst>
-                </a14:hiddenEffects>
-              </a:ext>
-            </a:extLst>
-          </p:spPr>
-          <p:txBody>
-            <a:bodyPr wrap="none" anchor="ctr"/>
-            <a:lstStyle/>
-            <a:p>
-              <a:endParaRPr lang="en-US"/>
-            </a:p>
-          </p:txBody>
-        </p:sp>
-        <p:sp>
-          <p:nvSpPr>
-            <p:cNvPr id="441365" name="Line 21"/>
-            <p:cNvSpPr>
-              <a:spLocks noChangeShapeType="1"/>
-            </p:cNvSpPr>
-            <p:nvPr/>
-          </p:nvSpPr>
-          <p:spPr bwMode="auto">
-            <a:xfrm>
-              <a:off x="1584" y="2688"/>
-              <a:ext cx="384" cy="0"/>
-            </a:xfrm>
-            <a:prstGeom prst="line">
-              <a:avLst/>
-            </a:prstGeom>
-            <a:noFill/>
-            <a:ln w="28575" cap="sq">
-              <a:solidFill>
-                <a:schemeClr val="tx1"/>
-              </a:solidFill>
-              <a:round/>
-              <a:headEnd type="triangle" w="sm" len="sm"/>
-              <a:tailEnd type="triangle" w="sm" len="sm"/>
-            </a:ln>
-            <a:effectLst/>
-            <a:extLst>
-              <a:ext uri="{909E8E84-426E-40dd-AFC4-6F175D3DCCD1}">
-                <a14:hiddenFill xmlns:a14="http://schemas.microsoft.com/office/drawing/2010/main">
-                  <a:noFill/>
-                </a14:hiddenFill>
-              </a:ext>
-              <a:ext uri="{AF507438-7753-43e0-B8FC-AC1667EBCBE1}">
-                <a14:hiddenEffects xmlns:a14="http://schemas.microsoft.com/office/drawing/2010/main">
-                  <a:effectLst>
-                    <a:outerShdw blurRad="63500" dist="38099" dir="2700000" algn="ctr" rotWithShape="0">
-                      <a:schemeClr val="bg2">
-                        <a:alpha val="74998"/>
-                      </a:schemeClr>
-                    </a:outerShdw>
-                  </a:effectLst>
-                </a14:hiddenEffects>
-              </a:ext>
-            </a:extLst>
-          </p:spPr>
-          <p:txBody>
-            <a:bodyPr wrap="none" anchor="ctr"/>
-            <a:lstStyle/>
-            <a:p>
-              <a:endParaRPr lang="en-US"/>
-            </a:p>
-          </p:txBody>
-        </p:sp>
-        <p:sp>
-          <p:nvSpPr>
-            <p:cNvPr id="441366" name="Line 22"/>
-            <p:cNvSpPr>
-              <a:spLocks noChangeShapeType="1"/>
-            </p:cNvSpPr>
-            <p:nvPr/>
-          </p:nvSpPr>
-          <p:spPr bwMode="auto">
-            <a:xfrm>
-              <a:off x="3264" y="2688"/>
-              <a:ext cx="384" cy="0"/>
-            </a:xfrm>
-            <a:prstGeom prst="line">
-              <a:avLst/>
-            </a:prstGeom>
-            <a:noFill/>
-            <a:ln w="28575" cap="sq">
-              <a:solidFill>
-                <a:schemeClr val="tx1"/>
-              </a:solidFill>
-              <a:round/>
-              <a:headEnd type="triangle" w="sm" len="sm"/>
-              <a:tailEnd type="triangle" w="sm" len="sm"/>
-            </a:ln>
-            <a:effectLst/>
-            <a:extLst>
-              <a:ext uri="{909E8E84-426E-40dd-AFC4-6F175D3DCCD1}">
-                <a14:hiddenFill xmlns:a14="http://schemas.microsoft.com/office/drawing/2010/main">
-                  <a:noFill/>
-                </a14:hiddenFill>
-              </a:ext>
-              <a:ext uri="{AF507438-7753-43e0-B8FC-AC1667EBCBE1}">
-                <a14:hiddenEffects xmlns:a14="http://schemas.microsoft.com/office/drawing/2010/main">
-                  <a:effectLst>
-                    <a:outerShdw blurRad="63500" dist="38099" dir="2700000" algn="ctr" rotWithShape="0">
-                      <a:schemeClr val="bg2">
-                        <a:alpha val="74998"/>
-                      </a:schemeClr>
-                    </a:outerShdw>
-                  </a:effectLst>
-                </a14:hiddenEffects>
-              </a:ext>
-            </a:extLst>
-          </p:spPr>
-          <p:txBody>
-            <a:bodyPr wrap="none" anchor="ctr"/>
-            <a:lstStyle/>
-            <a:p>
-              <a:endParaRPr lang="en-US"/>
-            </a:p>
-          </p:txBody>
-        </p:sp>
-        <p:sp>
-          <p:nvSpPr>
-            <p:cNvPr id="441367" name="Line 23"/>
-            <p:cNvSpPr>
-              <a:spLocks noChangeShapeType="1"/>
-            </p:cNvSpPr>
-            <p:nvPr/>
-          </p:nvSpPr>
-          <p:spPr bwMode="auto">
-            <a:xfrm>
-              <a:off x="3984" y="2688"/>
-              <a:ext cx="384" cy="0"/>
-            </a:xfrm>
-            <a:prstGeom prst="line">
-              <a:avLst/>
-            </a:prstGeom>
-            <a:noFill/>
-            <a:ln w="28575" cap="sq">
-              <a:solidFill>
-                <a:schemeClr val="tx1"/>
-              </a:solidFill>
-              <a:round/>
-              <a:headEnd type="triangle" w="sm" len="sm"/>
-              <a:tailEnd type="triangle" w="sm" len="sm"/>
-            </a:ln>
-            <a:effectLst/>
-            <a:extLst>
-              <a:ext uri="{909E8E84-426E-40dd-AFC4-6F175D3DCCD1}">
-                <a14:hiddenFill xmlns:a14="http://schemas.microsoft.com/office/drawing/2010/main">
-                  <a:noFill/>
-                </a14:hiddenFill>
-              </a:ext>
-              <a:ext uri="{AF507438-7753-43e0-B8FC-AC1667EBCBE1}">
-                <a14:hiddenEffects xmlns:a14="http://schemas.microsoft.com/office/drawing/2010/main">
-                  <a:effectLst>
-                    <a:outerShdw blurRad="63500" dist="38099" dir="2700000" algn="ctr" rotWithShape="0">
-                      <a:schemeClr val="bg2">
-                        <a:alpha val="74998"/>
-                      </a:schemeClr>
-                    </a:outerShdw>
-                  </a:effectLst>
-                </a14:hiddenEffects>
-              </a:ext>
-            </a:extLst>
-          </p:spPr>
-          <p:txBody>
-            <a:bodyPr wrap="none" anchor="ctr"/>
-            <a:lstStyle/>
-            <a:p>
-              <a:endParaRPr lang="en-US"/>
-            </a:p>
-          </p:txBody>
-        </p:sp>
-        <p:sp>
-          <p:nvSpPr>
-            <p:cNvPr id="441368" name="Line 24"/>
-            <p:cNvSpPr>
-              <a:spLocks noChangeShapeType="1"/>
-            </p:cNvSpPr>
-            <p:nvPr/>
-          </p:nvSpPr>
-          <p:spPr bwMode="auto">
-            <a:xfrm>
-              <a:off x="2352" y="2688"/>
-              <a:ext cx="384" cy="0"/>
-            </a:xfrm>
-            <a:prstGeom prst="line">
-              <a:avLst/>
-            </a:prstGeom>
-            <a:noFill/>
-            <a:ln w="28575" cap="sq">
-              <a:solidFill>
-                <a:schemeClr val="tx1"/>
-              </a:solidFill>
-              <a:round/>
-              <a:headEnd type="triangle" w="sm" len="sm"/>
-              <a:tailEnd type="triangle" w="sm" len="sm"/>
-            </a:ln>
-            <a:effectLst/>
-            <a:extLst>
-              <a:ext uri="{909E8E84-426E-40dd-AFC4-6F175D3DCCD1}">
-                <a14:hiddenFill xmlns:a14="http://schemas.microsoft.com/office/drawing/2010/main">
-                  <a:noFill/>
-                </a14:hiddenFill>
-              </a:ext>
-              <a:ext uri="{AF507438-7753-43e0-B8FC-AC1667EBCBE1}">
-                <a14:hiddenEffects xmlns:a14="http://schemas.microsoft.com/office/drawing/2010/main">
-                  <a:effectLst>
-                    <a:outerShdw blurRad="63500" dist="38099" dir="2700000" algn="ctr" rotWithShape="0">
-                      <a:schemeClr val="bg2">
-                        <a:alpha val="74998"/>
-                      </a:schemeClr>
-                    </a:outerShdw>
-                  </a:effectLst>
-                </a14:hiddenEffects>
-              </a:ext>
-            </a:extLst>
-          </p:spPr>
-          <p:txBody>
-            <a:bodyPr wrap="none" anchor="ctr"/>
-            <a:lstStyle/>
-            <a:p>
-              <a:endParaRPr lang="en-US"/>
-            </a:p>
-          </p:txBody>
-        </p:sp>
-        <p:sp>
-          <p:nvSpPr>
-            <p:cNvPr id="441369" name="Line 25"/>
-            <p:cNvSpPr>
-              <a:spLocks noChangeShapeType="1"/>
-            </p:cNvSpPr>
-            <p:nvPr/>
-          </p:nvSpPr>
-          <p:spPr bwMode="auto">
-            <a:xfrm flipH="1">
-              <a:off x="2352" y="2976"/>
-              <a:ext cx="384" cy="192"/>
-            </a:xfrm>
-            <a:prstGeom prst="line">
-              <a:avLst/>
-            </a:prstGeom>
-            <a:noFill/>
-            <a:ln w="38100" cap="sq">
-              <a:solidFill>
-                <a:schemeClr val="tx1"/>
-              </a:solidFill>
-              <a:round/>
-              <a:headEnd type="triangle" w="sm" len="sm"/>
-              <a:tailEnd type="triangle" w="sm" len="sm"/>
-            </a:ln>
-            <a:effectLst/>
-            <a:extLst>
-              <a:ext uri="{909E8E84-426E-40dd-AFC4-6F175D3DCCD1}">
-                <a14:hiddenFill xmlns:a14="http://schemas.microsoft.com/office/drawing/2010/main">
-                  <a:noFill/>
-                </a14:hiddenFill>
-              </a:ext>
-              <a:ext uri="{AF507438-7753-43e0-B8FC-AC1667EBCBE1}">
-                <a14:hiddenEffects xmlns:a14="http://schemas.microsoft.com/office/drawing/2010/main">
-                  <a:effectLst>
-                    <a:outerShdw blurRad="63500" dist="38099" dir="2700000" algn="ctr" rotWithShape="0">
-                      <a:schemeClr val="bg2">
-                        <a:alpha val="74998"/>
-                      </a:schemeClr>
-                    </a:outerShdw>
-                  </a:effectLst>
-                </a14:hiddenEffects>
-              </a:ext>
-            </a:extLst>
-          </p:spPr>
-          <p:txBody>
-            <a:bodyPr wrap="none" anchor="ctr"/>
-            <a:lstStyle/>
-            <a:p>
-              <a:endParaRPr lang="en-US"/>
-            </a:p>
-          </p:txBody>
-        </p:sp>
-        <p:sp>
-          <p:nvSpPr>
-            <p:cNvPr id="441370" name="Line 26"/>
-            <p:cNvSpPr>
-              <a:spLocks noChangeShapeType="1"/>
-            </p:cNvSpPr>
-            <p:nvPr/>
-          </p:nvSpPr>
-          <p:spPr bwMode="auto">
-            <a:xfrm flipH="1">
-              <a:off x="1632" y="3360"/>
-              <a:ext cx="384" cy="192"/>
-            </a:xfrm>
-            <a:prstGeom prst="line">
-              <a:avLst/>
-            </a:prstGeom>
-            <a:noFill/>
-            <a:ln w="38100" cap="sq">
-              <a:solidFill>
-                <a:schemeClr val="tx1"/>
-              </a:solidFill>
-              <a:round/>
-              <a:headEnd type="triangle" w="sm" len="sm"/>
-              <a:tailEnd type="triangle" w="sm" len="sm"/>
-            </a:ln>
-            <a:effectLst/>
-            <a:extLst>
-              <a:ext uri="{909E8E84-426E-40dd-AFC4-6F175D3DCCD1}">
-                <a14:hiddenFill xmlns:a14="http://schemas.microsoft.com/office/drawing/2010/main">
-                  <a:noFill/>
-                </a14:hiddenFill>
-              </a:ext>
-              <a:ext uri="{AF507438-7753-43e0-B8FC-AC1667EBCBE1}">
-                <a14:hiddenEffects xmlns:a14="http://schemas.microsoft.com/office/drawing/2010/main">
-                  <a:effectLst>
-                    <a:outerShdw blurRad="63500" dist="38099" dir="2700000" algn="ctr" rotWithShape="0">
-                      <a:schemeClr val="bg2">
-                        <a:alpha val="74998"/>
-                      </a:schemeClr>
-                    </a:outerShdw>
-                  </a:effectLst>
-                </a14:hiddenEffects>
-              </a:ext>
-            </a:extLst>
-          </p:spPr>
-          <p:txBody>
-            <a:bodyPr wrap="none" anchor="ctr"/>
-            <a:lstStyle/>
-            <a:p>
-              <a:endParaRPr lang="en-US"/>
-            </a:p>
-          </p:txBody>
-        </p:sp>
-        <p:sp>
-          <p:nvSpPr>
-            <p:cNvPr id="441371" name="Line 27"/>
-            <p:cNvSpPr>
-              <a:spLocks noChangeShapeType="1"/>
-            </p:cNvSpPr>
-            <p:nvPr/>
-          </p:nvSpPr>
-          <p:spPr bwMode="auto">
-            <a:xfrm flipH="1">
-              <a:off x="3840" y="1776"/>
-              <a:ext cx="384" cy="192"/>
-            </a:xfrm>
-            <a:prstGeom prst="line">
-              <a:avLst/>
-            </a:prstGeom>
-            <a:noFill/>
-            <a:ln w="38100" cap="sq">
-              <a:solidFill>
-                <a:schemeClr val="tx1"/>
-              </a:solidFill>
-              <a:round/>
-              <a:headEnd type="triangle" w="sm" len="sm"/>
-              <a:tailEnd type="triangle" w="sm" len="sm"/>
-            </a:ln>
-            <a:effectLst/>
-            <a:extLst>
-              <a:ext uri="{909E8E84-426E-40dd-AFC4-6F175D3DCCD1}">
-                <a14:hiddenFill xmlns:a14="http://schemas.microsoft.com/office/drawing/2010/main">
-                  <a:noFill/>
-                </a14:hiddenFill>
-              </a:ext>
-              <a:ext uri="{AF507438-7753-43e0-B8FC-AC1667EBCBE1}">
-                <a14:hiddenEffects xmlns:a14="http://schemas.microsoft.com/office/drawing/2010/main">
-                  <a:effectLst>
-                    <a:outerShdw blurRad="63500" dist="38099" dir="2700000" algn="ctr" rotWithShape="0">
-                      <a:schemeClr val="bg2">
-                        <a:alpha val="74998"/>
-                      </a:schemeClr>
-                    </a:outerShdw>
-                  </a:effectLst>
-                </a14:hiddenEffects>
-              </a:ext>
-            </a:extLst>
-          </p:spPr>
-          <p:txBody>
-            <a:bodyPr wrap="none" anchor="ctr"/>
-            <a:lstStyle/>
-            <a:p>
-              <a:endParaRPr lang="en-US"/>
-            </a:p>
-          </p:txBody>
-        </p:sp>
-        <p:sp>
-          <p:nvSpPr>
-            <p:cNvPr id="441372" name="Line 28"/>
-            <p:cNvSpPr>
-              <a:spLocks noChangeShapeType="1"/>
-            </p:cNvSpPr>
-            <p:nvPr/>
-          </p:nvSpPr>
-          <p:spPr bwMode="auto">
-            <a:xfrm flipH="1">
-              <a:off x="3264" y="2160"/>
-              <a:ext cx="384" cy="192"/>
-            </a:xfrm>
-            <a:prstGeom prst="line">
-              <a:avLst/>
-            </a:prstGeom>
-            <a:noFill/>
-            <a:ln w="38100" cap="sq">
-              <a:solidFill>
-                <a:schemeClr val="tx1"/>
-              </a:solidFill>
-              <a:round/>
-              <a:headEnd type="triangle" w="sm" len="sm"/>
-              <a:tailEnd type="triangle" w="sm" len="sm"/>
-            </a:ln>
-            <a:effectLst/>
-            <a:extLst>
-              <a:ext uri="{909E8E84-426E-40dd-AFC4-6F175D3DCCD1}">
-                <a14:hiddenFill xmlns:a14="http://schemas.microsoft.com/office/drawing/2010/main">
-                  <a:noFill/>
-                </a14:hiddenFill>
-              </a:ext>
-              <a:ext uri="{AF507438-7753-43e0-B8FC-AC1667EBCBE1}">
-                <a14:hiddenEffects xmlns:a14="http://schemas.microsoft.com/office/drawing/2010/main">
-                  <a:effectLst>
-                    <a:outerShdw blurRad="63500" dist="38099" dir="2700000" algn="ctr" rotWithShape="0">
-                      <a:schemeClr val="bg2">
-                        <a:alpha val="74998"/>
-                      </a:schemeClr>
-                    </a:outerShdw>
-                  </a:effectLst>
-                </a14:hiddenEffects>
-              </a:ext>
-            </a:extLst>
-          </p:spPr>
-          <p:txBody>
-            <a:bodyPr wrap="none" anchor="ctr"/>
-            <a:lstStyle/>
-            <a:p>
-              <a:endParaRPr lang="en-US"/>
-            </a:p>
-          </p:txBody>
-        </p:sp>
-        <p:sp>
-          <p:nvSpPr>
-            <p:cNvPr id="441373" name="Line 29"/>
-            <p:cNvSpPr>
-              <a:spLocks noChangeShapeType="1"/>
-            </p:cNvSpPr>
-            <p:nvPr/>
-          </p:nvSpPr>
-          <p:spPr bwMode="auto">
-            <a:xfrm>
-              <a:off x="3024" y="1728"/>
-              <a:ext cx="0" cy="192"/>
-            </a:xfrm>
-            <a:prstGeom prst="line">
-              <a:avLst/>
-            </a:prstGeom>
-            <a:noFill/>
-            <a:ln w="38100" cap="sq">
-              <a:solidFill>
-                <a:schemeClr val="tx1"/>
-              </a:solidFill>
-              <a:round/>
-              <a:headEnd type="triangle" w="sm" len="sm"/>
-              <a:tailEnd type="triangle" w="sm" len="sm"/>
-            </a:ln>
-            <a:effectLst/>
-            <a:extLst>
-              <a:ext uri="{909E8E84-426E-40dd-AFC4-6F175D3DCCD1}">
-                <a14:hiddenFill xmlns:a14="http://schemas.microsoft.com/office/drawing/2010/main">
-                  <a:noFill/>
-                </a14:hiddenFill>
-              </a:ext>
-              <a:ext uri="{AF507438-7753-43e0-B8FC-AC1667EBCBE1}">
-                <a14:hiddenEffects xmlns:a14="http://schemas.microsoft.com/office/drawing/2010/main">
-                  <a:effectLst>
-                    <a:outerShdw blurRad="63500" dist="38099" dir="2700000" algn="ctr" rotWithShape="0">
-                      <a:schemeClr val="bg2">
-                        <a:alpha val="74998"/>
-                      </a:schemeClr>
-                    </a:outerShdw>
-                  </a:effectLst>
-                </a14:hiddenEffects>
-              </a:ext>
-            </a:extLst>
-          </p:spPr>
-          <p:txBody>
-            <a:bodyPr wrap="none" anchor="ctr"/>
-            <a:lstStyle/>
-            <a:p>
-              <a:endParaRPr lang="en-US"/>
-            </a:p>
-          </p:txBody>
-        </p:sp>
-        <p:sp>
-          <p:nvSpPr>
-            <p:cNvPr id="441374" name="Line 30"/>
-            <p:cNvSpPr>
-              <a:spLocks noChangeShapeType="1"/>
-            </p:cNvSpPr>
-            <p:nvPr/>
-          </p:nvSpPr>
-          <p:spPr bwMode="auto">
-            <a:xfrm>
-              <a:off x="3024" y="2208"/>
-              <a:ext cx="0" cy="192"/>
-            </a:xfrm>
-            <a:prstGeom prst="line">
-              <a:avLst/>
-            </a:prstGeom>
-            <a:noFill/>
-            <a:ln w="38100" cap="sq">
-              <a:solidFill>
-                <a:schemeClr val="tx1"/>
-              </a:solidFill>
-              <a:round/>
-              <a:headEnd type="triangle" w="sm" len="sm"/>
-              <a:tailEnd type="triangle" w="sm" len="sm"/>
-            </a:ln>
-            <a:effectLst/>
-            <a:extLst>
-              <a:ext uri="{909E8E84-426E-40dd-AFC4-6F175D3DCCD1}">
-                <a14:hiddenFill xmlns:a14="http://schemas.microsoft.com/office/drawing/2010/main">
-                  <a:noFill/>
-                </a14:hiddenFill>
-              </a:ext>
-              <a:ext uri="{AF507438-7753-43e0-B8FC-AC1667EBCBE1}">
-                <a14:hiddenEffects xmlns:a14="http://schemas.microsoft.com/office/drawing/2010/main">
-                  <a:effectLst>
-                    <a:outerShdw blurRad="63500" dist="38099" dir="2700000" algn="ctr" rotWithShape="0">
-                      <a:schemeClr val="bg2">
-                        <a:alpha val="74998"/>
-                      </a:schemeClr>
-                    </a:outerShdw>
-                  </a:effectLst>
-                </a14:hiddenEffects>
-              </a:ext>
-            </a:extLst>
-          </p:spPr>
-          <p:txBody>
-            <a:bodyPr wrap="none" anchor="ctr"/>
-            <a:lstStyle/>
-            <a:p>
-              <a:endParaRPr lang="en-US"/>
-            </a:p>
-          </p:txBody>
-        </p:sp>
-        <p:sp>
-          <p:nvSpPr>
-            <p:cNvPr id="441375" name="Line 31"/>
-            <p:cNvSpPr>
-              <a:spLocks noChangeShapeType="1"/>
-            </p:cNvSpPr>
-            <p:nvPr/>
-          </p:nvSpPr>
-          <p:spPr bwMode="auto">
-            <a:xfrm>
-              <a:off x="2976" y="2976"/>
-              <a:ext cx="0" cy="192"/>
-            </a:xfrm>
-            <a:prstGeom prst="line">
-              <a:avLst/>
-            </a:prstGeom>
-            <a:noFill/>
-            <a:ln w="38100" cap="sq">
-              <a:solidFill>
-                <a:schemeClr val="tx1"/>
-              </a:solidFill>
-              <a:round/>
-              <a:headEnd type="triangle" w="sm" len="sm"/>
-              <a:tailEnd type="triangle" w="sm" len="sm"/>
-            </a:ln>
-            <a:effectLst/>
-            <a:extLst>
-              <a:ext uri="{909E8E84-426E-40dd-AFC4-6F175D3DCCD1}">
-                <a14:hiddenFill xmlns:a14="http://schemas.microsoft.com/office/drawing/2010/main">
-                  <a:noFill/>
-                </a14:hiddenFill>
-              </a:ext>
-              <a:ext uri="{AF507438-7753-43e0-B8FC-AC1667EBCBE1}">
-                <a14:hiddenEffects xmlns:a14="http://schemas.microsoft.com/office/drawing/2010/main">
-                  <a:effectLst>
-                    <a:outerShdw blurRad="63500" dist="38099" dir="2700000" algn="ctr" rotWithShape="0">
-                      <a:schemeClr val="bg2">
-                        <a:alpha val="74998"/>
-                      </a:schemeClr>
-                    </a:outerShdw>
-                  </a:effectLst>
-                </a14:hiddenEffects>
-              </a:ext>
-            </a:extLst>
-          </p:spPr>
-          <p:txBody>
-            <a:bodyPr wrap="none" anchor="ctr"/>
-            <a:lstStyle/>
-            <a:p>
-              <a:endParaRPr lang="en-US"/>
-            </a:p>
-          </p:txBody>
-        </p:sp>
-        <p:sp>
-          <p:nvSpPr>
-            <p:cNvPr id="441376" name="Line 32"/>
-            <p:cNvSpPr>
-              <a:spLocks noChangeShapeType="1"/>
-            </p:cNvSpPr>
-            <p:nvPr/>
-          </p:nvSpPr>
-          <p:spPr bwMode="auto">
-            <a:xfrm>
-              <a:off x="3024" y="3408"/>
-              <a:ext cx="0" cy="192"/>
-            </a:xfrm>
-            <a:prstGeom prst="line">
-              <a:avLst/>
-            </a:prstGeom>
-            <a:noFill/>
-            <a:ln w="38100" cap="sq">
-              <a:solidFill>
-                <a:schemeClr val="tx1"/>
-              </a:solidFill>
-              <a:round/>
-              <a:headEnd type="triangle" w="sm" len="sm"/>
-              <a:tailEnd type="triangle" w="sm" len="sm"/>
-            </a:ln>
-            <a:effectLst/>
-            <a:extLst>
-              <a:ext uri="{909E8E84-426E-40dd-AFC4-6F175D3DCCD1}">
-                <a14:hiddenFill xmlns:a14="http://schemas.microsoft.com/office/drawing/2010/main">
-                  <a:noFill/>
-                </a14:hiddenFill>
-              </a:ext>
-              <a:ext uri="{AF507438-7753-43e0-B8FC-AC1667EBCBE1}">
-                <a14:hiddenEffects xmlns:a14="http://schemas.microsoft.com/office/drawing/2010/main">
-                  <a:effectLst>
-                    <a:outerShdw blurRad="63500" dist="38099" dir="2700000" algn="ctr" rotWithShape="0">
-                      <a:schemeClr val="bg2">
-                        <a:alpha val="74998"/>
-                      </a:schemeClr>
-                    </a:outerShdw>
-                  </a:effectLst>
-                </a14:hiddenEffects>
-              </a:ext>
-            </a:extLst>
-          </p:spPr>
-          <p:txBody>
-            <a:bodyPr wrap="none" anchor="ctr"/>
-            <a:lstStyle/>
-            <a:p>
-              <a:endParaRPr lang="en-US"/>
-            </a:p>
-          </p:txBody>
-        </p:sp>
-        <p:sp>
-          <p:nvSpPr>
-            <p:cNvPr id="441377" name="Line 33"/>
-            <p:cNvSpPr>
-              <a:spLocks noChangeShapeType="1"/>
-            </p:cNvSpPr>
-            <p:nvPr/>
-          </p:nvSpPr>
-          <p:spPr bwMode="auto">
-            <a:xfrm>
-              <a:off x="1632" y="1728"/>
-              <a:ext cx="480" cy="288"/>
-            </a:xfrm>
-            <a:prstGeom prst="line">
-              <a:avLst/>
-            </a:prstGeom>
-            <a:noFill/>
-            <a:ln w="38100" cap="sq">
-              <a:solidFill>
-                <a:schemeClr val="tx1"/>
-              </a:solidFill>
-              <a:round/>
-              <a:headEnd type="triangle" w="sm" len="sm"/>
-              <a:tailEnd type="triangle" w="sm" len="sm"/>
-            </a:ln>
-            <a:effectLst/>
-            <a:extLst>
-              <a:ext uri="{909E8E84-426E-40dd-AFC4-6F175D3DCCD1}">
-                <a14:hiddenFill xmlns:a14="http://schemas.microsoft.com/office/drawing/2010/main">
-                  <a:noFill/>
-                </a14:hiddenFill>
-              </a:ext>
-              <a:ext uri="{AF507438-7753-43e0-B8FC-AC1667EBCBE1}">
-                <a14:hiddenEffects xmlns:a14="http://schemas.microsoft.com/office/drawing/2010/main">
-                  <a:effectLst>
-                    <a:outerShdw blurRad="63500" dist="38099" dir="2700000" algn="ctr" rotWithShape="0">
-                      <a:schemeClr val="bg2">
-                        <a:alpha val="74998"/>
-                      </a:schemeClr>
-                    </a:outerShdw>
-                  </a:effectLst>
-                </a14:hiddenEffects>
-              </a:ext>
-            </a:extLst>
-          </p:spPr>
-          <p:txBody>
-            <a:bodyPr wrap="none" anchor="ctr"/>
-            <a:lstStyle/>
-            <a:p>
-              <a:endParaRPr lang="en-US"/>
-            </a:p>
-          </p:txBody>
-        </p:sp>
-        <p:sp>
-          <p:nvSpPr>
-            <p:cNvPr id="441378" name="Line 34"/>
-            <p:cNvSpPr>
-              <a:spLocks noChangeShapeType="1"/>
-            </p:cNvSpPr>
-            <p:nvPr/>
-          </p:nvSpPr>
-          <p:spPr bwMode="auto">
-            <a:xfrm>
-              <a:off x="2352" y="2160"/>
-              <a:ext cx="480" cy="288"/>
-            </a:xfrm>
-            <a:prstGeom prst="line">
-              <a:avLst/>
-            </a:prstGeom>
-            <a:noFill/>
-            <a:ln w="38100" cap="sq">
-              <a:solidFill>
-                <a:schemeClr val="tx1"/>
-              </a:solidFill>
-              <a:round/>
-              <a:headEnd type="triangle" w="sm" len="sm"/>
-              <a:tailEnd type="triangle" w="sm" len="sm"/>
-            </a:ln>
-            <a:effectLst/>
-            <a:extLst>
-              <a:ext uri="{909E8E84-426E-40dd-AFC4-6F175D3DCCD1}">
-                <a14:hiddenFill xmlns:a14="http://schemas.microsoft.com/office/drawing/2010/main">
-                  <a:noFill/>
-                </a14:hiddenFill>
-              </a:ext>
-              <a:ext uri="{AF507438-7753-43e0-B8FC-AC1667EBCBE1}">
-                <a14:hiddenEffects xmlns:a14="http://schemas.microsoft.com/office/drawing/2010/main">
-                  <a:effectLst>
-                    <a:outerShdw blurRad="63500" dist="38099" dir="2700000" algn="ctr" rotWithShape="0">
-                      <a:schemeClr val="bg2">
-                        <a:alpha val="74998"/>
-                      </a:schemeClr>
-                    </a:outerShdw>
-                  </a:effectLst>
-                </a14:hiddenEffects>
-              </a:ext>
-            </a:extLst>
-          </p:spPr>
-          <p:txBody>
-            <a:bodyPr wrap="none" anchor="ctr"/>
-            <a:lstStyle/>
-            <a:p>
-              <a:endParaRPr lang="en-US"/>
-            </a:p>
-          </p:txBody>
-        </p:sp>
-        <p:sp>
-          <p:nvSpPr>
-            <p:cNvPr id="441379" name="Line 35"/>
-            <p:cNvSpPr>
-              <a:spLocks noChangeShapeType="1"/>
-            </p:cNvSpPr>
-            <p:nvPr/>
-          </p:nvSpPr>
-          <p:spPr bwMode="auto">
-            <a:xfrm>
-              <a:off x="3888" y="3312"/>
-              <a:ext cx="480" cy="288"/>
-            </a:xfrm>
-            <a:prstGeom prst="line">
-              <a:avLst/>
-            </a:prstGeom>
-            <a:noFill/>
-            <a:ln w="38100" cap="sq">
-              <a:solidFill>
-                <a:schemeClr val="tx1"/>
-              </a:solidFill>
-              <a:round/>
-              <a:headEnd type="triangle" w="sm" len="sm"/>
-              <a:tailEnd type="triangle" w="sm" len="sm"/>
-            </a:ln>
-            <a:effectLst/>
-            <a:extLst>
-              <a:ext uri="{909E8E84-426E-40dd-AFC4-6F175D3DCCD1}">
-                <a14:hiddenFill xmlns:a14="http://schemas.microsoft.com/office/drawing/2010/main">
-                  <a:noFill/>
-                </a14:hiddenFill>
-              </a:ext>
-              <a:ext uri="{AF507438-7753-43e0-B8FC-AC1667EBCBE1}">
-                <a14:hiddenEffects xmlns:a14="http://schemas.microsoft.com/office/drawing/2010/main">
-                  <a:effectLst>
-                    <a:outerShdw blurRad="63500" dist="38099" dir="2700000" algn="ctr" rotWithShape="0">
-                      <a:schemeClr val="bg2">
-                        <a:alpha val="74998"/>
-                      </a:schemeClr>
-                    </a:outerShdw>
-                  </a:effectLst>
-                </a14:hiddenEffects>
-              </a:ext>
-            </a:extLst>
-          </p:spPr>
-          <p:txBody>
-            <a:bodyPr wrap="none" anchor="ctr"/>
-            <a:lstStyle/>
-            <a:p>
-              <a:endParaRPr lang="en-US"/>
-            </a:p>
-          </p:txBody>
-        </p:sp>
-        <p:sp>
-          <p:nvSpPr>
-            <p:cNvPr id="441380" name="Line 36"/>
-            <p:cNvSpPr>
-              <a:spLocks noChangeShapeType="1"/>
-            </p:cNvSpPr>
-            <p:nvPr/>
-          </p:nvSpPr>
-          <p:spPr bwMode="auto">
-            <a:xfrm>
-              <a:off x="3264" y="2880"/>
-              <a:ext cx="480" cy="288"/>
-            </a:xfrm>
-            <a:prstGeom prst="line">
-              <a:avLst/>
-            </a:prstGeom>
-            <a:noFill/>
-            <a:ln w="38100" cap="sq">
-              <a:solidFill>
-                <a:schemeClr val="tx1"/>
-              </a:solidFill>
-              <a:round/>
-              <a:headEnd type="triangle" w="sm" len="sm"/>
-              <a:tailEnd type="triangle" w="sm" len="sm"/>
-            </a:ln>
-            <a:effectLst/>
-            <a:extLst>
-              <a:ext uri="{909E8E84-426E-40dd-AFC4-6F175D3DCCD1}">
-                <a14:hiddenFill xmlns:a14="http://schemas.microsoft.com/office/drawing/2010/main">
-                  <a:noFill/>
-                </a14:hiddenFill>
-              </a:ext>
-              <a:ext uri="{AF507438-7753-43e0-B8FC-AC1667EBCBE1}">
-                <a14:hiddenEffects xmlns:a14="http://schemas.microsoft.com/office/drawing/2010/main">
-                  <a:effectLst>
-                    <a:outerShdw blurRad="63500" dist="38099" dir="2700000" algn="ctr" rotWithShape="0">
-                      <a:schemeClr val="bg2">
-                        <a:alpha val="74998"/>
-                      </a:schemeClr>
-                    </a:outerShdw>
-                  </a:effectLst>
-                </a14:hiddenEffects>
-              </a:ext>
-            </a:extLst>
-          </p:spPr>
-          <p:txBody>
-            <a:bodyPr wrap="none" anchor="ctr"/>
-            <a:lstStyle/>
-            <a:p>
-              <a:endParaRPr lang="en-US"/>
-            </a:p>
-          </p:txBody>
-        </p:sp>
-        <p:sp>
-          <p:nvSpPr>
-            <p:cNvPr id="441381" name="Line 37"/>
-            <p:cNvSpPr>
-              <a:spLocks noChangeShapeType="1"/>
-            </p:cNvSpPr>
-            <p:nvPr/>
-          </p:nvSpPr>
-          <p:spPr bwMode="auto">
-            <a:xfrm>
-              <a:off x="1584" y="2688"/>
-              <a:ext cx="1152" cy="0"/>
-            </a:xfrm>
-            <a:prstGeom prst="line">
-              <a:avLst/>
-            </a:prstGeom>
-            <a:noFill/>
-            <a:ln w="12700" cap="sq">
-              <a:solidFill>
-                <a:schemeClr val="tx1"/>
-              </a:solidFill>
-              <a:round/>
-              <a:headEnd type="triangle" w="sm" len="sm"/>
-              <a:tailEnd type="triangle" w="sm" len="sm"/>
-            </a:ln>
-            <a:effectLst/>
-            <a:extLst>
-              <a:ext uri="{909E8E84-426E-40dd-AFC4-6F175D3DCCD1}">
-                <a14:hiddenFill xmlns:a14="http://schemas.microsoft.com/office/drawing/2010/main">
-                  <a:noFill/>
-                </a14:hiddenFill>
-              </a:ext>
-              <a:ext uri="{AF507438-7753-43e0-B8FC-AC1667EBCBE1}">
-                <a14:hiddenEffects xmlns:a14="http://schemas.microsoft.com/office/drawing/2010/main">
-                  <a:effectLst>
-                    <a:outerShdw blurRad="63500" dist="38099" dir="2700000" algn="ctr" rotWithShape="0">
-                      <a:schemeClr val="bg2">
-                        <a:alpha val="74998"/>
-                      </a:schemeClr>
-                    </a:outerShdw>
-                  </a:effectLst>
-                </a14:hiddenEffects>
-              </a:ext>
-            </a:extLst>
-          </p:spPr>
-          <p:txBody>
-            <a:bodyPr wrap="none" anchor="ctr"/>
-            <a:lstStyle/>
-            <a:p>
-              <a:endParaRPr lang="en-US"/>
-            </a:p>
-          </p:txBody>
-        </p:sp>
-        <p:sp>
-          <p:nvSpPr>
-            <p:cNvPr id="441382" name="AutoShape 38"/>
-            <p:cNvSpPr>
-              <a:spLocks noChangeArrowheads="1"/>
-            </p:cNvSpPr>
-            <p:nvPr/>
-          </p:nvSpPr>
-          <p:spPr bwMode="auto">
-            <a:xfrm>
-              <a:off x="2832" y="2544"/>
-              <a:ext cx="384" cy="240"/>
-            </a:xfrm>
-            <a:prstGeom prst="diamond">
-              <a:avLst/>
-            </a:prstGeom>
+            <a:round/>
+            <a:headEnd type="triangle" w="sm" len="sm"/>
+            <a:tailEnd type="triangle" w="sm" len="sm"/>
+          </a:ln>
+          <a:effectLst/>
+          <a:extLst>
+            <a:ext uri="{909E8E84-426E-40dd-AFC4-6F175D3DCCD1}">
+              <a14:hiddenFill xmlns:a14="http://schemas.microsoft.com/office/drawing/2010/main">
+                <a:noFill/>
+              </a14:hiddenFill>
+            </a:ext>
+            <a:ext uri="{AF507438-7753-43e0-B8FC-AC1667EBCBE1}">
+              <a14:hiddenEffects xmlns:a14="http://schemas.microsoft.com/office/drawing/2010/main">
+                <a:effectLst>
+                  <a:outerShdw blurRad="63500" dist="38099" dir="2700000" algn="ctr" rotWithShape="0">
+                    <a:schemeClr val="bg2">
+                      <a:alpha val="74998"/>
+                    </a:schemeClr>
+                  </a:outerShdw>
+                </a:effectLst>
+              </a14:hiddenEffects>
+            </a:ext>
+          </a:extLst>
+        </p:spPr>
+        <p:txBody>
+          <a:bodyPr wrap="none" anchor="ctr"/>
+          <a:lstStyle/>
+          <a:p>
+            <a:endParaRPr lang="en-US"/>
+          </a:p>
+        </p:txBody>
+      </p:sp>
+      <p:sp>
+        <p:nvSpPr>
+          <p:cNvPr id="441366" name="Line 22"/>
+          <p:cNvSpPr>
+            <a:spLocks noChangeShapeType="1"/>
+          </p:cNvSpPr>
+          <p:nvPr/>
+        </p:nvSpPr>
+        <p:spPr bwMode="auto">
+          <a:xfrm>
+            <a:off x="2672862" y="4029856"/>
+            <a:ext cx="398585" cy="0"/>
+          </a:xfrm>
+          <a:prstGeom prst="line">
+            <a:avLst/>
+          </a:prstGeom>
+          <a:noFill/>
+          <a:ln w="28575" cap="sq">
             <a:solidFill>
-              <a:srgbClr val="FF00FF"/>
+              <a:schemeClr val="tx1"/>
             </a:solidFill>
-            <a:ln w="12700" cap="sq">
-              <a:solidFill>
-                <a:schemeClr val="tx1"/>
-              </a:solidFill>
-              <a:miter lim="800000"/>
-              <a:headEnd type="none" w="sm" len="sm"/>
-              <a:tailEnd type="none" w="sm" len="sm"/>
-            </a:ln>
-            <a:effectLst/>
-            <a:extLst>
-              <a:ext uri="{AF507438-7753-43e0-B8FC-AC1667EBCBE1}">
-                <a14:hiddenEffects xmlns:a14="http://schemas.microsoft.com/office/drawing/2010/main">
-                  <a:effectLst>
-                    <a:outerShdw blurRad="63500" dist="38099" dir="2700000" algn="ctr" rotWithShape="0">
-                      <a:schemeClr val="bg2">
-                        <a:alpha val="74998"/>
-                      </a:schemeClr>
-                    </a:outerShdw>
-                  </a:effectLst>
-                </a14:hiddenEffects>
-              </a:ext>
-            </a:extLst>
-          </p:spPr>
-          <p:txBody>
-            <a:bodyPr wrap="none" anchor="ctr"/>
-            <a:lstStyle/>
-            <a:p>
-              <a:endParaRPr lang="en-US"/>
-            </a:p>
-          </p:txBody>
-        </p:sp>
-      </p:grpSp>
+            <a:round/>
+            <a:headEnd type="triangle" w="sm" len="sm"/>
+            <a:tailEnd type="triangle" w="sm" len="sm"/>
+          </a:ln>
+          <a:effectLst/>
+          <a:extLst>
+            <a:ext uri="{909E8E84-426E-40dd-AFC4-6F175D3DCCD1}">
+              <a14:hiddenFill xmlns:a14="http://schemas.microsoft.com/office/drawing/2010/main">
+                <a:noFill/>
+              </a14:hiddenFill>
+            </a:ext>
+            <a:ext uri="{AF507438-7753-43e0-B8FC-AC1667EBCBE1}">
+              <a14:hiddenEffects xmlns:a14="http://schemas.microsoft.com/office/drawing/2010/main">
+                <a:effectLst>
+                  <a:outerShdw blurRad="63500" dist="38099" dir="2700000" algn="ctr" rotWithShape="0">
+                    <a:schemeClr val="bg2">
+                      <a:alpha val="74998"/>
+                    </a:schemeClr>
+                  </a:outerShdw>
+                </a:effectLst>
+              </a14:hiddenEffects>
+            </a:ext>
+          </a:extLst>
+        </p:spPr>
+        <p:txBody>
+          <a:bodyPr wrap="none" anchor="ctr"/>
+          <a:lstStyle/>
+          <a:p>
+            <a:endParaRPr lang="en-US"/>
+          </a:p>
+        </p:txBody>
+      </p:sp>
+      <p:sp>
+        <p:nvSpPr>
+          <p:cNvPr id="441367" name="Line 23"/>
+          <p:cNvSpPr>
+            <a:spLocks noChangeShapeType="1"/>
+          </p:cNvSpPr>
+          <p:nvPr/>
+        </p:nvSpPr>
+        <p:spPr bwMode="auto">
+          <a:xfrm>
+            <a:off x="3420208" y="4029856"/>
+            <a:ext cx="398585" cy="0"/>
+          </a:xfrm>
+          <a:prstGeom prst="line">
+            <a:avLst/>
+          </a:prstGeom>
+          <a:noFill/>
+          <a:ln w="28575" cap="sq">
+            <a:solidFill>
+              <a:schemeClr val="tx1"/>
+            </a:solidFill>
+            <a:round/>
+            <a:headEnd type="triangle" w="sm" len="sm"/>
+            <a:tailEnd type="triangle" w="sm" len="sm"/>
+          </a:ln>
+          <a:effectLst/>
+          <a:extLst>
+            <a:ext uri="{909E8E84-426E-40dd-AFC4-6F175D3DCCD1}">
+              <a14:hiddenFill xmlns:a14="http://schemas.microsoft.com/office/drawing/2010/main">
+                <a:noFill/>
+              </a14:hiddenFill>
+            </a:ext>
+            <a:ext uri="{AF507438-7753-43e0-B8FC-AC1667EBCBE1}">
+              <a14:hiddenEffects xmlns:a14="http://schemas.microsoft.com/office/drawing/2010/main">
+                <a:effectLst>
+                  <a:outerShdw blurRad="63500" dist="38099" dir="2700000" algn="ctr" rotWithShape="0">
+                    <a:schemeClr val="bg2">
+                      <a:alpha val="74998"/>
+                    </a:schemeClr>
+                  </a:outerShdw>
+                </a:effectLst>
+              </a14:hiddenEffects>
+            </a:ext>
+          </a:extLst>
+        </p:spPr>
+        <p:txBody>
+          <a:bodyPr wrap="none" anchor="ctr"/>
+          <a:lstStyle/>
+          <a:p>
+            <a:endParaRPr lang="en-US"/>
+          </a:p>
+        </p:txBody>
+      </p:sp>
+      <p:sp>
+        <p:nvSpPr>
+          <p:cNvPr id="441368" name="Line 24"/>
+          <p:cNvSpPr>
+            <a:spLocks noChangeShapeType="1"/>
+          </p:cNvSpPr>
+          <p:nvPr/>
+        </p:nvSpPr>
+        <p:spPr bwMode="auto">
+          <a:xfrm>
+            <a:off x="1726223" y="4029856"/>
+            <a:ext cx="398585" cy="0"/>
+          </a:xfrm>
+          <a:prstGeom prst="line">
+            <a:avLst/>
+          </a:prstGeom>
+          <a:noFill/>
+          <a:ln w="28575" cap="sq">
+            <a:solidFill>
+              <a:schemeClr val="tx1"/>
+            </a:solidFill>
+            <a:round/>
+            <a:headEnd type="triangle" w="sm" len="sm"/>
+            <a:tailEnd type="triangle" w="sm" len="sm"/>
+          </a:ln>
+          <a:effectLst/>
+          <a:extLst>
+            <a:ext uri="{909E8E84-426E-40dd-AFC4-6F175D3DCCD1}">
+              <a14:hiddenFill xmlns:a14="http://schemas.microsoft.com/office/drawing/2010/main">
+                <a:noFill/>
+              </a14:hiddenFill>
+            </a:ext>
+            <a:ext uri="{AF507438-7753-43e0-B8FC-AC1667EBCBE1}">
+              <a14:hiddenEffects xmlns:a14="http://schemas.microsoft.com/office/drawing/2010/main">
+                <a:effectLst>
+                  <a:outerShdw blurRad="63500" dist="38099" dir="2700000" algn="ctr" rotWithShape="0">
+                    <a:schemeClr val="bg2">
+                      <a:alpha val="74998"/>
+                    </a:schemeClr>
+                  </a:outerShdw>
+                </a:effectLst>
+              </a14:hiddenEffects>
+            </a:ext>
+          </a:extLst>
+        </p:spPr>
+        <p:txBody>
+          <a:bodyPr wrap="none" anchor="ctr"/>
+          <a:lstStyle/>
+          <a:p>
+            <a:endParaRPr lang="en-US"/>
+          </a:p>
+        </p:txBody>
+      </p:sp>
+      <p:sp>
+        <p:nvSpPr>
+          <p:cNvPr id="441369" name="Line 25"/>
+          <p:cNvSpPr>
+            <a:spLocks noChangeShapeType="1"/>
+          </p:cNvSpPr>
+          <p:nvPr/>
+        </p:nvSpPr>
+        <p:spPr bwMode="auto">
+          <a:xfrm flipH="1">
+            <a:off x="1726223" y="4382125"/>
+            <a:ext cx="398585" cy="234846"/>
+          </a:xfrm>
+          <a:prstGeom prst="line">
+            <a:avLst/>
+          </a:prstGeom>
+          <a:noFill/>
+          <a:ln w="38100" cap="sq">
+            <a:solidFill>
+              <a:schemeClr val="tx1"/>
+            </a:solidFill>
+            <a:round/>
+            <a:headEnd type="triangle" w="sm" len="sm"/>
+            <a:tailEnd type="triangle" w="sm" len="sm"/>
+          </a:ln>
+          <a:effectLst/>
+          <a:extLst>
+            <a:ext uri="{909E8E84-426E-40dd-AFC4-6F175D3DCCD1}">
+              <a14:hiddenFill xmlns:a14="http://schemas.microsoft.com/office/drawing/2010/main">
+                <a:noFill/>
+              </a14:hiddenFill>
+            </a:ext>
+            <a:ext uri="{AF507438-7753-43e0-B8FC-AC1667EBCBE1}">
+              <a14:hiddenEffects xmlns:a14="http://schemas.microsoft.com/office/drawing/2010/main">
+                <a:effectLst>
+                  <a:outerShdw blurRad="63500" dist="38099" dir="2700000" algn="ctr" rotWithShape="0">
+                    <a:schemeClr val="bg2">
+                      <a:alpha val="74998"/>
+                    </a:schemeClr>
+                  </a:outerShdw>
+                </a:effectLst>
+              </a14:hiddenEffects>
+            </a:ext>
+          </a:extLst>
+        </p:spPr>
+        <p:txBody>
+          <a:bodyPr wrap="none" anchor="ctr"/>
+          <a:lstStyle/>
+          <a:p>
+            <a:endParaRPr lang="en-US"/>
+          </a:p>
+        </p:txBody>
+      </p:sp>
+      <p:sp>
+        <p:nvSpPr>
+          <p:cNvPr id="441370" name="Line 26"/>
+          <p:cNvSpPr>
+            <a:spLocks noChangeShapeType="1"/>
+          </p:cNvSpPr>
+          <p:nvPr/>
+        </p:nvSpPr>
+        <p:spPr bwMode="auto">
+          <a:xfrm flipH="1">
+            <a:off x="978877" y="4800600"/>
+            <a:ext cx="398585" cy="234846"/>
+          </a:xfrm>
+          <a:prstGeom prst="line">
+            <a:avLst/>
+          </a:prstGeom>
+          <a:noFill/>
+          <a:ln w="38100" cap="sq">
+            <a:solidFill>
+              <a:schemeClr val="tx1"/>
+            </a:solidFill>
+            <a:round/>
+            <a:headEnd type="triangle" w="sm" len="sm"/>
+            <a:tailEnd type="triangle" w="sm" len="sm"/>
+          </a:ln>
+          <a:effectLst/>
+          <a:extLst>
+            <a:ext uri="{909E8E84-426E-40dd-AFC4-6F175D3DCCD1}">
+              <a14:hiddenFill xmlns:a14="http://schemas.microsoft.com/office/drawing/2010/main">
+                <a:noFill/>
+              </a14:hiddenFill>
+            </a:ext>
+            <a:ext uri="{AF507438-7753-43e0-B8FC-AC1667EBCBE1}">
+              <a14:hiddenEffects xmlns:a14="http://schemas.microsoft.com/office/drawing/2010/main">
+                <a:effectLst>
+                  <a:outerShdw blurRad="63500" dist="38099" dir="2700000" algn="ctr" rotWithShape="0">
+                    <a:schemeClr val="bg2">
+                      <a:alpha val="74998"/>
+                    </a:schemeClr>
+                  </a:outerShdw>
+                </a:effectLst>
+              </a14:hiddenEffects>
+            </a:ext>
+          </a:extLst>
+        </p:spPr>
+        <p:txBody>
+          <a:bodyPr wrap="none" anchor="ctr"/>
+          <a:lstStyle/>
+          <a:p>
+            <a:endParaRPr lang="en-US"/>
+          </a:p>
+        </p:txBody>
+      </p:sp>
+      <p:sp>
+        <p:nvSpPr>
+          <p:cNvPr id="441371" name="Line 27"/>
+          <p:cNvSpPr>
+            <a:spLocks noChangeShapeType="1"/>
+          </p:cNvSpPr>
+          <p:nvPr/>
+        </p:nvSpPr>
+        <p:spPr bwMode="auto">
+          <a:xfrm flipH="1">
+            <a:off x="3276600" y="2965554"/>
+            <a:ext cx="398585" cy="234846"/>
+          </a:xfrm>
+          <a:prstGeom prst="line">
+            <a:avLst/>
+          </a:prstGeom>
+          <a:noFill/>
+          <a:ln w="38100" cap="sq">
+            <a:solidFill>
+              <a:schemeClr val="tx1"/>
+            </a:solidFill>
+            <a:round/>
+            <a:headEnd type="triangle" w="sm" len="sm"/>
+            <a:tailEnd type="triangle" w="sm" len="sm"/>
+          </a:ln>
+          <a:effectLst/>
+          <a:extLst>
+            <a:ext uri="{909E8E84-426E-40dd-AFC4-6F175D3DCCD1}">
+              <a14:hiddenFill xmlns:a14="http://schemas.microsoft.com/office/drawing/2010/main">
+                <a:noFill/>
+              </a14:hiddenFill>
+            </a:ext>
+            <a:ext uri="{AF507438-7753-43e0-B8FC-AC1667EBCBE1}">
+              <a14:hiddenEffects xmlns:a14="http://schemas.microsoft.com/office/drawing/2010/main">
+                <a:effectLst>
+                  <a:outerShdw blurRad="63500" dist="38099" dir="2700000" algn="ctr" rotWithShape="0">
+                    <a:schemeClr val="bg2">
+                      <a:alpha val="74998"/>
+                    </a:schemeClr>
+                  </a:outerShdw>
+                </a:effectLst>
+              </a14:hiddenEffects>
+            </a:ext>
+          </a:extLst>
+        </p:spPr>
+        <p:txBody>
+          <a:bodyPr wrap="none" anchor="ctr"/>
+          <a:lstStyle/>
+          <a:p>
+            <a:endParaRPr lang="en-US"/>
+          </a:p>
+        </p:txBody>
+      </p:sp>
+      <p:sp>
+        <p:nvSpPr>
+          <p:cNvPr id="441372" name="Line 28"/>
+          <p:cNvSpPr>
+            <a:spLocks noChangeShapeType="1"/>
+          </p:cNvSpPr>
+          <p:nvPr/>
+        </p:nvSpPr>
+        <p:spPr bwMode="auto">
+          <a:xfrm flipH="1">
+            <a:off x="2672862" y="3384030"/>
+            <a:ext cx="398585" cy="234846"/>
+          </a:xfrm>
+          <a:prstGeom prst="line">
+            <a:avLst/>
+          </a:prstGeom>
+          <a:noFill/>
+          <a:ln w="38100" cap="sq">
+            <a:solidFill>
+              <a:schemeClr val="tx1"/>
+            </a:solidFill>
+            <a:round/>
+            <a:headEnd type="triangle" w="sm" len="sm"/>
+            <a:tailEnd type="triangle" w="sm" len="sm"/>
+          </a:ln>
+          <a:effectLst/>
+          <a:extLst>
+            <a:ext uri="{909E8E84-426E-40dd-AFC4-6F175D3DCCD1}">
+              <a14:hiddenFill xmlns:a14="http://schemas.microsoft.com/office/drawing/2010/main">
+                <a:noFill/>
+              </a14:hiddenFill>
+            </a:ext>
+            <a:ext uri="{AF507438-7753-43e0-B8FC-AC1667EBCBE1}">
+              <a14:hiddenEffects xmlns:a14="http://schemas.microsoft.com/office/drawing/2010/main">
+                <a:effectLst>
+                  <a:outerShdw blurRad="63500" dist="38099" dir="2700000" algn="ctr" rotWithShape="0">
+                    <a:schemeClr val="bg2">
+                      <a:alpha val="74998"/>
+                    </a:schemeClr>
+                  </a:outerShdw>
+                </a:effectLst>
+              </a14:hiddenEffects>
+            </a:ext>
+          </a:extLst>
+        </p:spPr>
+        <p:txBody>
+          <a:bodyPr wrap="none" anchor="ctr"/>
+          <a:lstStyle/>
+          <a:p>
+            <a:endParaRPr lang="en-US"/>
+          </a:p>
+        </p:txBody>
+      </p:sp>
+      <p:sp>
+        <p:nvSpPr>
+          <p:cNvPr id="441373" name="Line 29"/>
+          <p:cNvSpPr>
+            <a:spLocks noChangeShapeType="1"/>
+          </p:cNvSpPr>
+          <p:nvPr/>
+        </p:nvSpPr>
+        <p:spPr bwMode="auto">
+          <a:xfrm>
+            <a:off x="2423746" y="2855626"/>
+            <a:ext cx="0" cy="234846"/>
+          </a:xfrm>
+          <a:prstGeom prst="line">
+            <a:avLst/>
+          </a:prstGeom>
+          <a:noFill/>
+          <a:ln w="38100" cap="sq">
+            <a:solidFill>
+              <a:schemeClr val="tx1"/>
+            </a:solidFill>
+            <a:round/>
+            <a:headEnd type="triangle" w="sm" len="sm"/>
+            <a:tailEnd type="triangle" w="sm" len="sm"/>
+          </a:ln>
+          <a:effectLst/>
+          <a:extLst>
+            <a:ext uri="{909E8E84-426E-40dd-AFC4-6F175D3DCCD1}">
+              <a14:hiddenFill xmlns:a14="http://schemas.microsoft.com/office/drawing/2010/main">
+                <a:noFill/>
+              </a14:hiddenFill>
+            </a:ext>
+            <a:ext uri="{AF507438-7753-43e0-B8FC-AC1667EBCBE1}">
+              <a14:hiddenEffects xmlns:a14="http://schemas.microsoft.com/office/drawing/2010/main">
+                <a:effectLst>
+                  <a:outerShdw blurRad="63500" dist="38099" dir="2700000" algn="ctr" rotWithShape="0">
+                    <a:schemeClr val="bg2">
+                      <a:alpha val="74998"/>
+                    </a:schemeClr>
+                  </a:outerShdw>
+                </a:effectLst>
+              </a14:hiddenEffects>
+            </a:ext>
+          </a:extLst>
+        </p:spPr>
+        <p:txBody>
+          <a:bodyPr wrap="none" anchor="ctr"/>
+          <a:lstStyle/>
+          <a:p>
+            <a:endParaRPr lang="en-US"/>
+          </a:p>
+        </p:txBody>
+      </p:sp>
+      <p:sp>
+        <p:nvSpPr>
+          <p:cNvPr id="441374" name="Line 30"/>
+          <p:cNvSpPr>
+            <a:spLocks noChangeShapeType="1"/>
+          </p:cNvSpPr>
+          <p:nvPr/>
+        </p:nvSpPr>
+        <p:spPr bwMode="auto">
+          <a:xfrm>
+            <a:off x="2423746" y="3442741"/>
+            <a:ext cx="0" cy="234846"/>
+          </a:xfrm>
+          <a:prstGeom prst="line">
+            <a:avLst/>
+          </a:prstGeom>
+          <a:noFill/>
+          <a:ln w="38100" cap="sq">
+            <a:solidFill>
+              <a:schemeClr val="tx1"/>
+            </a:solidFill>
+            <a:round/>
+            <a:headEnd type="triangle" w="sm" len="sm"/>
+            <a:tailEnd type="triangle" w="sm" len="sm"/>
+          </a:ln>
+          <a:effectLst/>
+          <a:extLst>
+            <a:ext uri="{909E8E84-426E-40dd-AFC4-6F175D3DCCD1}">
+              <a14:hiddenFill xmlns:a14="http://schemas.microsoft.com/office/drawing/2010/main">
+                <a:noFill/>
+              </a14:hiddenFill>
+            </a:ext>
+            <a:ext uri="{AF507438-7753-43e0-B8FC-AC1667EBCBE1}">
+              <a14:hiddenEffects xmlns:a14="http://schemas.microsoft.com/office/drawing/2010/main">
+                <a:effectLst>
+                  <a:outerShdw blurRad="63500" dist="38099" dir="2700000" algn="ctr" rotWithShape="0">
+                    <a:schemeClr val="bg2">
+                      <a:alpha val="74998"/>
+                    </a:schemeClr>
+                  </a:outerShdw>
+                </a:effectLst>
+              </a14:hiddenEffects>
+            </a:ext>
+          </a:extLst>
+        </p:spPr>
+        <p:txBody>
+          <a:bodyPr wrap="none" anchor="ctr"/>
+          <a:lstStyle/>
+          <a:p>
+            <a:endParaRPr lang="en-US"/>
+          </a:p>
+        </p:txBody>
+      </p:sp>
+      <p:sp>
+        <p:nvSpPr>
+          <p:cNvPr id="441375" name="Line 31"/>
+          <p:cNvSpPr>
+            <a:spLocks noChangeShapeType="1"/>
+          </p:cNvSpPr>
+          <p:nvPr/>
+        </p:nvSpPr>
+        <p:spPr bwMode="auto">
+          <a:xfrm>
+            <a:off x="2373923" y="4382125"/>
+            <a:ext cx="0" cy="234846"/>
+          </a:xfrm>
+          <a:prstGeom prst="line">
+            <a:avLst/>
+          </a:prstGeom>
+          <a:noFill/>
+          <a:ln w="38100" cap="sq">
+            <a:solidFill>
+              <a:schemeClr val="tx1"/>
+            </a:solidFill>
+            <a:round/>
+            <a:headEnd type="triangle" w="sm" len="sm"/>
+            <a:tailEnd type="triangle" w="sm" len="sm"/>
+          </a:ln>
+          <a:effectLst/>
+          <a:extLst>
+            <a:ext uri="{909E8E84-426E-40dd-AFC4-6F175D3DCCD1}">
+              <a14:hiddenFill xmlns:a14="http://schemas.microsoft.com/office/drawing/2010/main">
+                <a:noFill/>
+              </a14:hiddenFill>
+            </a:ext>
+            <a:ext uri="{AF507438-7753-43e0-B8FC-AC1667EBCBE1}">
+              <a14:hiddenEffects xmlns:a14="http://schemas.microsoft.com/office/drawing/2010/main">
+                <a:effectLst>
+                  <a:outerShdw blurRad="63500" dist="38099" dir="2700000" algn="ctr" rotWithShape="0">
+                    <a:schemeClr val="bg2">
+                      <a:alpha val="74998"/>
+                    </a:schemeClr>
+                  </a:outerShdw>
+                </a:effectLst>
+              </a14:hiddenEffects>
+            </a:ext>
+          </a:extLst>
+        </p:spPr>
+        <p:txBody>
+          <a:bodyPr wrap="none" anchor="ctr"/>
+          <a:lstStyle/>
+          <a:p>
+            <a:endParaRPr lang="en-US"/>
+          </a:p>
+        </p:txBody>
+      </p:sp>
+      <p:sp>
+        <p:nvSpPr>
+          <p:cNvPr id="441376" name="Line 32"/>
+          <p:cNvSpPr>
+            <a:spLocks noChangeShapeType="1"/>
+          </p:cNvSpPr>
+          <p:nvPr/>
+        </p:nvSpPr>
+        <p:spPr bwMode="auto">
+          <a:xfrm>
+            <a:off x="2362200" y="4910528"/>
+            <a:ext cx="0" cy="234846"/>
+          </a:xfrm>
+          <a:prstGeom prst="line">
+            <a:avLst/>
+          </a:prstGeom>
+          <a:noFill/>
+          <a:ln w="38100" cap="sq">
+            <a:solidFill>
+              <a:schemeClr val="tx1"/>
+            </a:solidFill>
+            <a:round/>
+            <a:headEnd type="triangle" w="sm" len="sm"/>
+            <a:tailEnd type="triangle" w="sm" len="sm"/>
+          </a:ln>
+          <a:effectLst/>
+          <a:extLst>
+            <a:ext uri="{909E8E84-426E-40dd-AFC4-6F175D3DCCD1}">
+              <a14:hiddenFill xmlns:a14="http://schemas.microsoft.com/office/drawing/2010/main">
+                <a:noFill/>
+              </a14:hiddenFill>
+            </a:ext>
+            <a:ext uri="{AF507438-7753-43e0-B8FC-AC1667EBCBE1}">
+              <a14:hiddenEffects xmlns:a14="http://schemas.microsoft.com/office/drawing/2010/main">
+                <a:effectLst>
+                  <a:outerShdw blurRad="63500" dist="38099" dir="2700000" algn="ctr" rotWithShape="0">
+                    <a:schemeClr val="bg2">
+                      <a:alpha val="74998"/>
+                    </a:schemeClr>
+                  </a:outerShdw>
+                </a:effectLst>
+              </a14:hiddenEffects>
+            </a:ext>
+          </a:extLst>
+        </p:spPr>
+        <p:txBody>
+          <a:bodyPr wrap="none" anchor="ctr"/>
+          <a:lstStyle/>
+          <a:p>
+            <a:endParaRPr lang="en-US"/>
+          </a:p>
+        </p:txBody>
+      </p:sp>
+      <p:sp>
+        <p:nvSpPr>
+          <p:cNvPr id="441377" name="Line 33"/>
+          <p:cNvSpPr>
+            <a:spLocks noChangeShapeType="1"/>
+          </p:cNvSpPr>
+          <p:nvPr/>
+        </p:nvSpPr>
+        <p:spPr bwMode="auto">
+          <a:xfrm>
+            <a:off x="1066800" y="2964305"/>
+            <a:ext cx="410308" cy="236095"/>
+          </a:xfrm>
+          <a:prstGeom prst="line">
+            <a:avLst/>
+          </a:prstGeom>
+          <a:noFill/>
+          <a:ln w="38100" cap="sq">
+            <a:solidFill>
+              <a:schemeClr val="tx1"/>
+            </a:solidFill>
+            <a:round/>
+            <a:headEnd type="triangle" w="sm" len="sm"/>
+            <a:tailEnd type="triangle" w="sm" len="sm"/>
+          </a:ln>
+          <a:effectLst/>
+          <a:extLst>
+            <a:ext uri="{909E8E84-426E-40dd-AFC4-6F175D3DCCD1}">
+              <a14:hiddenFill xmlns:a14="http://schemas.microsoft.com/office/drawing/2010/main">
+                <a:noFill/>
+              </a14:hiddenFill>
+            </a:ext>
+            <a:ext uri="{AF507438-7753-43e0-B8FC-AC1667EBCBE1}">
+              <a14:hiddenEffects xmlns:a14="http://schemas.microsoft.com/office/drawing/2010/main">
+                <a:effectLst>
+                  <a:outerShdw blurRad="63500" dist="38099" dir="2700000" algn="ctr" rotWithShape="0">
+                    <a:schemeClr val="bg2">
+                      <a:alpha val="74998"/>
+                    </a:schemeClr>
+                  </a:outerShdw>
+                </a:effectLst>
+              </a14:hiddenEffects>
+            </a:ext>
+          </a:extLst>
+        </p:spPr>
+        <p:txBody>
+          <a:bodyPr wrap="none" anchor="ctr"/>
+          <a:lstStyle/>
+          <a:p>
+            <a:endParaRPr lang="en-US"/>
+          </a:p>
+        </p:txBody>
+      </p:sp>
+      <p:sp>
+        <p:nvSpPr>
+          <p:cNvPr id="441378" name="Line 34"/>
+          <p:cNvSpPr>
+            <a:spLocks noChangeShapeType="1"/>
+          </p:cNvSpPr>
+          <p:nvPr/>
+        </p:nvSpPr>
+        <p:spPr bwMode="auto">
+          <a:xfrm>
+            <a:off x="1726223" y="3384031"/>
+            <a:ext cx="331177" cy="273570"/>
+          </a:xfrm>
+          <a:prstGeom prst="line">
+            <a:avLst/>
+          </a:prstGeom>
+          <a:noFill/>
+          <a:ln w="38100" cap="sq">
+            <a:solidFill>
+              <a:schemeClr val="tx1"/>
+            </a:solidFill>
+            <a:round/>
+            <a:headEnd type="triangle" w="sm" len="sm"/>
+            <a:tailEnd type="triangle" w="sm" len="sm"/>
+          </a:ln>
+          <a:effectLst/>
+          <a:extLst>
+            <a:ext uri="{909E8E84-426E-40dd-AFC4-6F175D3DCCD1}">
+              <a14:hiddenFill xmlns:a14="http://schemas.microsoft.com/office/drawing/2010/main">
+                <a:noFill/>
+              </a14:hiddenFill>
+            </a:ext>
+            <a:ext uri="{AF507438-7753-43e0-B8FC-AC1667EBCBE1}">
+              <a14:hiddenEffects xmlns:a14="http://schemas.microsoft.com/office/drawing/2010/main">
+                <a:effectLst>
+                  <a:outerShdw blurRad="63500" dist="38099" dir="2700000" algn="ctr" rotWithShape="0">
+                    <a:schemeClr val="bg2">
+                      <a:alpha val="74998"/>
+                    </a:schemeClr>
+                  </a:outerShdw>
+                </a:effectLst>
+              </a14:hiddenEffects>
+            </a:ext>
+          </a:extLst>
+        </p:spPr>
+        <p:txBody>
+          <a:bodyPr wrap="none" anchor="ctr"/>
+          <a:lstStyle/>
+          <a:p>
+            <a:endParaRPr lang="en-US"/>
+          </a:p>
+        </p:txBody>
+      </p:sp>
+      <p:sp>
+        <p:nvSpPr>
+          <p:cNvPr id="441379" name="Line 35"/>
+          <p:cNvSpPr>
+            <a:spLocks noChangeShapeType="1"/>
+          </p:cNvSpPr>
+          <p:nvPr/>
+        </p:nvSpPr>
+        <p:spPr bwMode="auto">
+          <a:xfrm>
+            <a:off x="3429000" y="4876800"/>
+            <a:ext cx="389793" cy="268574"/>
+          </a:xfrm>
+          <a:prstGeom prst="line">
+            <a:avLst/>
+          </a:prstGeom>
+          <a:noFill/>
+          <a:ln w="38100" cap="sq">
+            <a:solidFill>
+              <a:schemeClr val="tx1"/>
+            </a:solidFill>
+            <a:round/>
+            <a:headEnd type="triangle" w="sm" len="sm"/>
+            <a:tailEnd type="triangle" w="sm" len="sm"/>
+          </a:ln>
+          <a:effectLst/>
+          <a:extLst>
+            <a:ext uri="{909E8E84-426E-40dd-AFC4-6F175D3DCCD1}">
+              <a14:hiddenFill xmlns:a14="http://schemas.microsoft.com/office/drawing/2010/main">
+                <a:noFill/>
+              </a14:hiddenFill>
+            </a:ext>
+            <a:ext uri="{AF507438-7753-43e0-B8FC-AC1667EBCBE1}">
+              <a14:hiddenEffects xmlns:a14="http://schemas.microsoft.com/office/drawing/2010/main">
+                <a:effectLst>
+                  <a:outerShdw blurRad="63500" dist="38099" dir="2700000" algn="ctr" rotWithShape="0">
+                    <a:schemeClr val="bg2">
+                      <a:alpha val="74998"/>
+                    </a:schemeClr>
+                  </a:outerShdw>
+                </a:effectLst>
+              </a14:hiddenEffects>
+            </a:ext>
+          </a:extLst>
+        </p:spPr>
+        <p:txBody>
+          <a:bodyPr wrap="none" anchor="ctr"/>
+          <a:lstStyle/>
+          <a:p>
+            <a:endParaRPr lang="en-US"/>
+          </a:p>
+        </p:txBody>
+      </p:sp>
+      <p:sp>
+        <p:nvSpPr>
+          <p:cNvPr id="441380" name="Line 36"/>
+          <p:cNvSpPr>
+            <a:spLocks noChangeShapeType="1"/>
+          </p:cNvSpPr>
+          <p:nvPr/>
+        </p:nvSpPr>
+        <p:spPr bwMode="auto">
+          <a:xfrm>
+            <a:off x="2672862" y="4295931"/>
+            <a:ext cx="498231" cy="352269"/>
+          </a:xfrm>
+          <a:prstGeom prst="line">
+            <a:avLst/>
+          </a:prstGeom>
+          <a:noFill/>
+          <a:ln w="38100" cap="sq">
+            <a:solidFill>
+              <a:schemeClr val="tx1"/>
+            </a:solidFill>
+            <a:round/>
+            <a:headEnd type="triangle" w="sm" len="sm"/>
+            <a:tailEnd type="triangle" w="sm" len="sm"/>
+          </a:ln>
+          <a:effectLst/>
+          <a:extLst>
+            <a:ext uri="{909E8E84-426E-40dd-AFC4-6F175D3DCCD1}">
+              <a14:hiddenFill xmlns:a14="http://schemas.microsoft.com/office/drawing/2010/main">
+                <a:noFill/>
+              </a14:hiddenFill>
+            </a:ext>
+            <a:ext uri="{AF507438-7753-43e0-B8FC-AC1667EBCBE1}">
+              <a14:hiddenEffects xmlns:a14="http://schemas.microsoft.com/office/drawing/2010/main">
+                <a:effectLst>
+                  <a:outerShdw blurRad="63500" dist="38099" dir="2700000" algn="ctr" rotWithShape="0">
+                    <a:schemeClr val="bg2">
+                      <a:alpha val="74998"/>
+                    </a:schemeClr>
+                  </a:outerShdw>
+                </a:effectLst>
+              </a14:hiddenEffects>
+            </a:ext>
+          </a:extLst>
+        </p:spPr>
+        <p:txBody>
+          <a:bodyPr wrap="none" anchor="ctr"/>
+          <a:lstStyle/>
+          <a:p>
+            <a:endParaRPr lang="en-US"/>
+          </a:p>
+        </p:txBody>
+      </p:sp>
+      <p:sp>
+        <p:nvSpPr>
+          <p:cNvPr id="441381" name="Line 37"/>
+          <p:cNvSpPr>
+            <a:spLocks noChangeShapeType="1"/>
+          </p:cNvSpPr>
+          <p:nvPr/>
+        </p:nvSpPr>
+        <p:spPr bwMode="auto">
+          <a:xfrm>
+            <a:off x="929054" y="4029856"/>
+            <a:ext cx="1195754" cy="0"/>
+          </a:xfrm>
+          <a:prstGeom prst="line">
+            <a:avLst/>
+          </a:prstGeom>
+          <a:noFill/>
+          <a:ln w="12700" cap="sq">
+            <a:solidFill>
+              <a:schemeClr val="tx1"/>
+            </a:solidFill>
+            <a:round/>
+            <a:headEnd type="triangle" w="sm" len="sm"/>
+            <a:tailEnd type="triangle" w="sm" len="sm"/>
+          </a:ln>
+          <a:effectLst/>
+          <a:extLst>
+            <a:ext uri="{909E8E84-426E-40dd-AFC4-6F175D3DCCD1}">
+              <a14:hiddenFill xmlns:a14="http://schemas.microsoft.com/office/drawing/2010/main">
+                <a:noFill/>
+              </a14:hiddenFill>
+            </a:ext>
+            <a:ext uri="{AF507438-7753-43e0-B8FC-AC1667EBCBE1}">
+              <a14:hiddenEffects xmlns:a14="http://schemas.microsoft.com/office/drawing/2010/main">
+                <a:effectLst>
+                  <a:outerShdw blurRad="63500" dist="38099" dir="2700000" algn="ctr" rotWithShape="0">
+                    <a:schemeClr val="bg2">
+                      <a:alpha val="74998"/>
+                    </a:schemeClr>
+                  </a:outerShdw>
+                </a:effectLst>
+              </a14:hiddenEffects>
+            </a:ext>
+          </a:extLst>
+        </p:spPr>
+        <p:txBody>
+          <a:bodyPr wrap="none" anchor="ctr"/>
+          <a:lstStyle/>
+          <a:p>
+            <a:endParaRPr lang="en-US"/>
+          </a:p>
+        </p:txBody>
+      </p:sp>
+      <p:sp>
+        <p:nvSpPr>
+          <p:cNvPr id="441382" name="AutoShape 38"/>
+          <p:cNvSpPr>
+            <a:spLocks noChangeArrowheads="1"/>
+          </p:cNvSpPr>
+          <p:nvPr/>
+        </p:nvSpPr>
+        <p:spPr bwMode="auto">
+          <a:xfrm>
+            <a:off x="2224454" y="3853721"/>
+            <a:ext cx="398585" cy="293557"/>
+          </a:xfrm>
+          <a:prstGeom prst="diamond">
+            <a:avLst/>
+          </a:prstGeom>
+          <a:solidFill>
+            <a:srgbClr val="FF00FF"/>
+          </a:solidFill>
+          <a:ln w="12700" cap="sq">
+            <a:solidFill>
+              <a:schemeClr val="tx1"/>
+            </a:solidFill>
+            <a:miter lim="800000"/>
+            <a:headEnd type="none" w="sm" len="sm"/>
+            <a:tailEnd type="none" w="sm" len="sm"/>
+          </a:ln>
+          <a:effectLst/>
+          <a:extLst>
+            <a:ext uri="{AF507438-7753-43e0-B8FC-AC1667EBCBE1}">
+              <a14:hiddenEffects xmlns:a14="http://schemas.microsoft.com/office/drawing/2010/main">
+                <a:effectLst>
+                  <a:outerShdw blurRad="63500" dist="38099" dir="2700000" algn="ctr" rotWithShape="0">
+                    <a:schemeClr val="bg2">
+                      <a:alpha val="74998"/>
+                    </a:schemeClr>
+                  </a:outerShdw>
+                </a:effectLst>
+              </a14:hiddenEffects>
+            </a:ext>
+          </a:extLst>
+        </p:spPr>
+        <p:txBody>
+          <a:bodyPr wrap="none" anchor="ctr"/>
+          <a:lstStyle/>
+          <a:p>
+            <a:endParaRPr lang="en-US"/>
+          </a:p>
+        </p:txBody>
+      </p:sp>
       <p:sp>
         <p:nvSpPr>
           <p:cNvPr id="441383" name="Rectangle 39"/>
@@ -11065,6 +11113,56 @@
               <a:rPr lang="en-US"/>
               <a:t>3-away interactions: 7x7x7</a:t>
             </a:r>
+          </a:p>
+        </p:txBody>
+      </p:sp>
+      <p:sp>
+        <p:nvSpPr>
+          <p:cNvPr id="42" name="AutoShape 14"/>
+          <p:cNvSpPr>
+            <a:spLocks noChangeArrowheads="1"/>
+          </p:cNvSpPr>
+          <p:nvPr/>
+        </p:nvSpPr>
+        <p:spPr bwMode="auto">
+          <a:xfrm>
+            <a:off x="1354015" y="3886200"/>
+            <a:ext cx="398585" cy="293557"/>
+          </a:xfrm>
+          <a:prstGeom prst="diamond">
+            <a:avLst/>
+          </a:prstGeom>
+          <a:solidFill>
+            <a:srgbClr val="FF00FF"/>
+          </a:solidFill>
+          <a:ln w="12700" cap="sq">
+            <a:solidFill>
+              <a:schemeClr val="tx1"/>
+            </a:solidFill>
+            <a:miter lim="800000"/>
+            <a:headEnd type="none" w="sm" len="sm"/>
+            <a:tailEnd type="none" w="sm" len="sm"/>
+          </a:ln>
+          <a:effectLst/>
+          <a:extLst>
+            <a:ext uri="{AF507438-7753-43e0-B8FC-AC1667EBCBE1}">
+              <a14:hiddenEffects xmlns:a14="http://schemas.microsoft.com/office/drawing/2010/main">
+                <a:effectLst>
+                  <a:outerShdw blurRad="63500" dist="38099" dir="2700000" algn="ctr" rotWithShape="0">
+                    <a:schemeClr val="bg2">
+                      <a:alpha val="74998"/>
+                    </a:schemeClr>
+                  </a:outerShdw>
+                </a:effectLst>
+              </a14:hiddenEffects>
+            </a:ext>
+          </a:extLst>
+        </p:spPr>
+        <p:txBody>
+          <a:bodyPr wrap="none" anchor="ctr"/>
+          <a:lstStyle/>
+          <a:p>
+            <a:endParaRPr lang="en-US"/>
           </a:p>
         </p:txBody>
       </p:sp>
@@ -12762,7 +12860,7 @@
     <mc:Choice Requires="p14">
       <p:transition spd="slow" p14:dur="2000"/>
     </mc:Choice>
-    <mc:Fallback xmlns="" xmlns:mv="urn:schemas-microsoft-com:mac:vml">
+    <mc:Fallback xmlns:mv="urn:schemas-microsoft-com:mac:vml" xmlns="">
       <mp:transition xmlns:mp="http://schemas.microsoft.com/office/mac/powerpoint/2008/main" spd="slow"/>
     </mc:Fallback>
   </mc:AlternateContent>
@@ -13154,7 +13252,7 @@
           <a:p>
             <a:fld id="{09C6702D-41FD-0E4C-AA08-A952FD8D96EA}" type="datetime1">
               <a:rPr lang="en-US" smtClean="0"/>
-              <a:t>9/15/12</a:t>
+              <a:t>11/8/12</a:t>
             </a:fld>
             <a:endParaRPr lang="en-US" dirty="0"/>
           </a:p>
@@ -13661,7 +13759,7 @@
             </a:pPr>
             <a:fld id="{0E255A7D-7C7E-224D-87F0-A26955F6FDCD}" type="datetime1">
               <a:rPr lang="en-US" smtClean="0"/>
-              <a:t>9/15/12</a:t>
+              <a:t>11/8/12</a:t>
             </a:fld>
             <a:endParaRPr lang="en-US" dirty="0"/>
           </a:p>

</xml_diff>